<commit_message>
Replaced Windows Azure references in speaker notes
</commit_message>
<xml_diff>
--- a/PaaS/Building Cloud Solutions.pptx
+++ b/PaaS/Building Cloud Solutions.pptx
@@ -276,7 +276,7 @@
           <a:p>
             <a:fld id="{9EB326D8-4C38-4835-91AB-B79CDC0B07B3}" type="datetimeFigureOut">
               <a:rPr lang="en-US" smtClean="0"/>
-              <a:t>7/21/2014</a:t>
+              <a:t>10/6/2014</a:t>
             </a:fld>
             <a:endParaRPr lang="en-US"/>
           </a:p>
@@ -1196,7 +1196,23 @@
             </a:r>
             <a:r>
               <a:rPr lang="en-US" baseline="0" dirty="0" smtClean="0"/>
-              <a:t> a standard IIS ASP.NET Web Site should work in Windows Azure. At MIX09, we additionally added support for IIS7’s FastCGI capability. As a note, any files that are part of a asp.net project on windows azure are READ ONLY! If you need to be able to change the contents of files:</a:t>
+              <a:t> a standard IIS ASP.NET Web Site should work in </a:t>
+            </a:r>
+            <a:r>
+              <a:rPr lang="en-US" baseline="0" dirty="0" smtClean="0"/>
+              <a:t>Microsoft Azure. </a:t>
+            </a:r>
+            <a:r>
+              <a:rPr lang="en-US" baseline="0" dirty="0" smtClean="0"/>
+              <a:t>At MIX09, we additionally added support for IIS7’s FastCGI capability. As a note, any files that are part of a asp.net project on </a:t>
+            </a:r>
+            <a:r>
+              <a:rPr lang="en-US" baseline="0" dirty="0" smtClean="0"/>
+              <a:t>Microsoft Azure </a:t>
+            </a:r>
+            <a:r>
+              <a:rPr lang="en-US" baseline="0" dirty="0" smtClean="0"/>
+              <a:t>are READ ONLY! If you need to be able to change the contents of files:</a:t>
             </a:r>
           </a:p>
           <a:p>
@@ -1754,7 +1770,15 @@
           <a:p>
             <a:r>
               <a:rPr lang="en-US" b="0" baseline="0" dirty="0" smtClean="0"/>
-              <a:t>Notes on the various security roles involved in running a Windows Azure account</a:t>
+              <a:t>Notes on the various security roles involved in running a </a:t>
+            </a:r>
+            <a:r>
+              <a:rPr lang="en-US" b="0" baseline="0" dirty="0" smtClean="0"/>
+              <a:t>Microsoft Azure </a:t>
+            </a:r>
+            <a:r>
+              <a:rPr lang="en-US" b="0" baseline="0" dirty="0" smtClean="0"/>
+              <a:t>account</a:t>
             </a:r>
           </a:p>
           <a:p>
@@ -2687,7 +2711,7 @@
           <a:p>
             <a:fld id="{2DFDA5C7-BBAE-481E-8BF7-731156A2E2C1}" type="datetime8">
               <a:rPr lang="en-US" smtClean="0"/>
-              <a:t>7/21/2014 10:53 AM</a:t>
+              <a:t>10/6/2014 3:24 PM</a:t>
             </a:fld>
             <a:endParaRPr lang="en-US" dirty="0"/>
           </a:p>
@@ -2872,7 +2896,7 @@
           <a:p>
             <a:fld id="{2DFDA5C7-BBAE-481E-8BF7-731156A2E2C1}" type="datetime8">
               <a:rPr lang="en-US" smtClean="0"/>
-              <a:t>7/21/2014 10:53 AM</a:t>
+              <a:t>10/6/2014 3:24 PM</a:t>
             </a:fld>
             <a:endParaRPr lang="en-US" dirty="0"/>
           </a:p>
@@ -3065,7 +3089,7 @@
           <a:p>
             <a:fld id="{2DFDA5C7-BBAE-481E-8BF7-731156A2E2C1}" type="datetime8">
               <a:rPr lang="en-US" smtClean="0"/>
-              <a:t>7/21/2014 10:53 AM</a:t>
+              <a:t>10/6/2014 3:24 PM</a:t>
             </a:fld>
             <a:endParaRPr lang="en-US" dirty="0"/>
           </a:p>
@@ -3250,7 +3274,7 @@
           <a:p>
             <a:fld id="{2DFDA5C7-BBAE-481E-8BF7-731156A2E2C1}" type="datetime8">
               <a:rPr lang="en-US" smtClean="0"/>
-              <a:t>7/21/2014 10:53 AM</a:t>
+              <a:t>10/6/2014 3:24 PM</a:t>
             </a:fld>
             <a:endParaRPr lang="en-US" dirty="0"/>
           </a:p>
@@ -3435,7 +3459,7 @@
           <a:p>
             <a:fld id="{2DFDA5C7-BBAE-481E-8BF7-731156A2E2C1}" type="datetime8">
               <a:rPr lang="en-US" smtClean="0"/>
-              <a:t>7/21/2014 10:53 AM</a:t>
+              <a:t>10/6/2014 3:24 PM</a:t>
             </a:fld>
             <a:endParaRPr lang="en-US" dirty="0"/>
           </a:p>
@@ -3620,7 +3644,7 @@
           <a:p>
             <a:fld id="{2DFDA5C7-BBAE-481E-8BF7-731156A2E2C1}" type="datetime8">
               <a:rPr lang="en-US" smtClean="0"/>
-              <a:t>7/21/2014 10:53 AM</a:t>
+              <a:t>10/6/2014 3:24 PM</a:t>
             </a:fld>
             <a:endParaRPr lang="en-US" dirty="0"/>
           </a:p>
@@ -3840,7 +3864,7 @@
                 </a:solidFill>
               </a:rPr>
               <a:pPr/>
-              <a:t>7/21/2014</a:t>
+              <a:t>10/6/2014</a:t>
             </a:fld>
             <a:endParaRPr lang="en-US" dirty="0">
               <a:solidFill>
@@ -8753,7 +8777,7 @@
           <a:graphicData uri="http://schemas.openxmlformats.org/presentationml/2006/ole">
             <mc:AlternateContent xmlns:mc="http://schemas.openxmlformats.org/markup-compatibility/2006">
               <mc:Choice xmlns:v="urn:schemas-microsoft-com:vml" Requires="v">
-                <p:oleObj spid="_x0000_s1058" name="think-cell Slide" r:id="rId7" imgW="270" imgH="270" progId="TCLayout.ActiveDocument.1">
+                <p:oleObj spid="_x0000_s1059" name="think-cell Slide" r:id="rId7" imgW="270" imgH="270" progId="TCLayout.ActiveDocument.1">
                   <p:embed/>
                 </p:oleObj>
               </mc:Choice>
@@ -9970,7 +9994,7 @@
           <a:graphicData uri="http://schemas.openxmlformats.org/presentationml/2006/ole">
             <mc:AlternateContent xmlns:mc="http://schemas.openxmlformats.org/markup-compatibility/2006">
               <mc:Choice xmlns:v="urn:schemas-microsoft-com:vml" Requires="v">
-                <p:oleObj spid="_x0000_s2079" name="think-cell Slide" r:id="rId6" imgW="270" imgH="270" progId="TCLayout.ActiveDocument.1">
+                <p:oleObj spid="_x0000_s2080" name="think-cell Slide" r:id="rId6" imgW="270" imgH="270" progId="TCLayout.ActiveDocument.1">
                   <p:embed/>
                 </p:oleObj>
               </mc:Choice>
@@ -11162,7 +11186,7 @@
           <a:graphicData uri="http://schemas.openxmlformats.org/presentationml/2006/ole">
             <mc:AlternateContent xmlns:mc="http://schemas.openxmlformats.org/markup-compatibility/2006">
               <mc:Choice xmlns:v="urn:schemas-microsoft-com:vml" Requires="v">
-                <p:oleObj spid="_x0000_s3102" name="think-cell Slide" r:id="rId6" imgW="270" imgH="270" progId="TCLayout.ActiveDocument.1">
+                <p:oleObj spid="_x0000_s3103" name="think-cell Slide" r:id="rId6" imgW="270" imgH="270" progId="TCLayout.ActiveDocument.1">
                   <p:embed/>
                 </p:oleObj>
               </mc:Choice>
@@ -12646,7 +12670,7 @@
           <a:graphicData uri="http://schemas.openxmlformats.org/presentationml/2006/ole">
             <mc:AlternateContent xmlns:mc="http://schemas.openxmlformats.org/markup-compatibility/2006">
               <mc:Choice xmlns:v="urn:schemas-microsoft-com:vml" Requires="v">
-                <p:oleObj spid="_x0000_s6169" name="think-cell Slide" r:id="rId5" imgW="270" imgH="270" progId="TCLayout.ActiveDocument.1">
+                <p:oleObj spid="_x0000_s6170" name="think-cell Slide" r:id="rId5" imgW="270" imgH="270" progId="TCLayout.ActiveDocument.1">
                   <p:embed/>
                 </p:oleObj>
               </mc:Choice>
@@ -35906,7 +35930,7 @@
           <a:graphicData uri="http://schemas.openxmlformats.org/presentationml/2006/ole">
             <mc:AlternateContent xmlns:mc="http://schemas.openxmlformats.org/markup-compatibility/2006">
               <mc:Choice xmlns:v="urn:schemas-microsoft-com:vml" Requires="v">
-                <p:oleObj spid="_x0000_s7176" name="think-cell Slide" r:id="rId5" imgW="270" imgH="270" progId="TCLayout.ActiveDocument.1">
+                <p:oleObj spid="_x0000_s7177" name="think-cell Slide" r:id="rId5" imgW="270" imgH="270" progId="TCLayout.ActiveDocument.1">
                   <p:embed/>
                 </p:oleObj>
               </mc:Choice>
@@ -37038,15 +37062,6 @@
 </file>
 
 <file path=customXml/item1.xml><?xml version="1.0" encoding="utf-8"?>
-<?mso-contentType ?>
-<FormTemplates xmlns="http://schemas.microsoft.com/sharepoint/v3/contenttype/forms">
-  <Display>DocumentLibraryForm</Display>
-  <Edit>DocumentLibraryForm</Edit>
-  <New>DocumentLibraryForm</New>
-</FormTemplates>
-</file>
-
-<file path=customXml/item2.xml><?xml version="1.0" encoding="utf-8"?>
 <p:properties xmlns:p="http://schemas.microsoft.com/office/2006/metadata/properties" xmlns:xsi="http://www.w3.org/2001/XMLSchema-instance" xmlns:pc="http://schemas.microsoft.com/office/infopath/2007/PartnerControls">
   <documentManagement>
     <SharedWithUsers xmlns="fee586e5-3c92-48eb-9898-42915e590ada">
@@ -37058,6 +37073,15 @@
     </SharedWithUsers>
   </documentManagement>
 </p:properties>
+</file>
+
+<file path=customXml/item2.xml><?xml version="1.0" encoding="utf-8"?>
+<?mso-contentType ?>
+<FormTemplates xmlns="http://schemas.microsoft.com/sharepoint/v3/contenttype/forms">
+  <Display>DocumentLibraryForm</Display>
+  <Edit>DocumentLibraryForm</Edit>
+  <New>DocumentLibraryForm</New>
+</FormTemplates>
 </file>
 
 <file path=customXml/item3.xml><?xml version="1.0" encoding="utf-8"?>
@@ -37201,14 +37225,6 @@
 </file>
 
 <file path=customXml/itemProps1.xml><?xml version="1.0" encoding="utf-8"?>
-<ds:datastoreItem xmlns:ds="http://schemas.openxmlformats.org/officeDocument/2006/customXml" ds:itemID="{14B32142-DE2C-423C-A302-95CAC214862A}">
-  <ds:schemaRefs>
-    <ds:schemaRef ds:uri="http://schemas.microsoft.com/sharepoint/v3/contenttype/forms"/>
-  </ds:schemaRefs>
-</ds:datastoreItem>
-</file>
-
-<file path=customXml/itemProps2.xml><?xml version="1.0" encoding="utf-8"?>
 <ds:datastoreItem xmlns:ds="http://schemas.openxmlformats.org/officeDocument/2006/customXml" ds:itemID="{B030EFEA-9AEA-457C-BAA8-93C4281792F5}">
   <ds:schemaRefs>
     <ds:schemaRef ds:uri="http://purl.org/dc/terms/"/>
@@ -37220,6 +37236,14 @@
     <ds:schemaRef ds:uri="fee586e5-3c92-48eb-9898-42915e590ada"/>
     <ds:schemaRef ds:uri="http://www.w3.org/XML/1998/namespace"/>
     <ds:schemaRef ds:uri="http://purl.org/dc/dcmitype/"/>
+  </ds:schemaRefs>
+</ds:datastoreItem>
+</file>
+
+<file path=customXml/itemProps2.xml><?xml version="1.0" encoding="utf-8"?>
+<ds:datastoreItem xmlns:ds="http://schemas.openxmlformats.org/officeDocument/2006/customXml" ds:itemID="{14B32142-DE2C-423C-A302-95CAC214862A}">
+  <ds:schemaRefs>
+    <ds:schemaRef ds:uri="http://schemas.microsoft.com/sharepoint/v3/contenttype/forms"/>
   </ds:schemaRefs>
 </ds:datastoreItem>
 </file>

</xml_diff>

<commit_message>
Updated Mobile deck: offline sync, script source control, resource broker
</commit_message>
<xml_diff>
--- a/PaaS/Building Cloud Solutions.pptx
+++ b/PaaS/Building Cloud Solutions.pptx
@@ -5,7 +5,7 @@
     <p:sldMasterId id="2147483660" r:id="rId4"/>
   </p:sldMasterIdLst>
   <p:notesMasterIdLst>
-    <p:notesMasterId r:id="rId34"/>
+    <p:notesMasterId r:id="rId35"/>
   </p:notesMasterIdLst>
   <p:sldIdLst>
     <p:sldId id="256" r:id="rId5"/>
@@ -25,18 +25,19 @@
     <p:sldId id="530" r:id="rId19"/>
     <p:sldId id="531" r:id="rId20"/>
     <p:sldId id="545" r:id="rId21"/>
-    <p:sldId id="544" r:id="rId22"/>
-    <p:sldId id="553" r:id="rId23"/>
-    <p:sldId id="554" r:id="rId24"/>
-    <p:sldId id="556" r:id="rId25"/>
-    <p:sldId id="559" r:id="rId26"/>
-    <p:sldId id="560" r:id="rId27"/>
-    <p:sldId id="561" r:id="rId28"/>
-    <p:sldId id="563" r:id="rId29"/>
-    <p:sldId id="564" r:id="rId30"/>
-    <p:sldId id="562" r:id="rId31"/>
-    <p:sldId id="495" r:id="rId32"/>
-    <p:sldId id="454" r:id="rId33"/>
+    <p:sldId id="567" r:id="rId22"/>
+    <p:sldId id="544" r:id="rId23"/>
+    <p:sldId id="553" r:id="rId24"/>
+    <p:sldId id="554" r:id="rId25"/>
+    <p:sldId id="556" r:id="rId26"/>
+    <p:sldId id="559" r:id="rId27"/>
+    <p:sldId id="560" r:id="rId28"/>
+    <p:sldId id="561" r:id="rId29"/>
+    <p:sldId id="563" r:id="rId30"/>
+    <p:sldId id="564" r:id="rId31"/>
+    <p:sldId id="562" r:id="rId32"/>
+    <p:sldId id="495" r:id="rId33"/>
+    <p:sldId id="454" r:id="rId34"/>
   </p:sldIdLst>
   <p:sldSz cx="12192000" cy="6858000"/>
   <p:notesSz cx="7010400" cy="9296400"/>
@@ -161,6 +162,7 @@
             <p14:sldId id="530"/>
             <p14:sldId id="531"/>
             <p14:sldId id="545"/>
+            <p14:sldId id="567"/>
             <p14:sldId id="544"/>
             <p14:sldId id="553"/>
             <p14:sldId id="554"/>
@@ -278,7 +280,7 @@
           <a:p>
             <a:fld id="{9EB326D8-4C38-4835-91AB-B79CDC0B07B3}" type="datetimeFigureOut">
               <a:rPr lang="en-US" smtClean="0"/>
-              <a:t>12/11/2014</a:t>
+              <a:t>1/30/2015</a:t>
             </a:fld>
             <a:endParaRPr lang="en-US"/>
           </a:p>
@@ -2155,7 +2157,7 @@
           <a:p>
             <a:fld id="{2C52CFDC-D2D5-4B9F-BA75-89F771E01AEB}" type="slidenum">
               <a:rPr lang="en-US" smtClean="0"/>
-              <a:t>18</a:t>
+              <a:t>19</a:t>
             </a:fld>
             <a:endParaRPr lang="en-US"/>
           </a:p>
@@ -2239,7 +2241,7 @@
           <a:p>
             <a:fld id="{2C52CFDC-D2D5-4B9F-BA75-89F771E01AEB}" type="slidenum">
               <a:rPr lang="en-US" smtClean="0"/>
-              <a:t>19</a:t>
+              <a:t>20</a:t>
             </a:fld>
             <a:endParaRPr lang="en-US"/>
           </a:p>
@@ -2412,7 +2414,7 @@
           <a:p>
             <a:fld id="{2C52CFDC-D2D5-4B9F-BA75-89F771E01AEB}" type="slidenum">
               <a:rPr lang="en-US" smtClean="0"/>
-              <a:t>20</a:t>
+              <a:t>21</a:t>
             </a:fld>
             <a:endParaRPr lang="en-US"/>
           </a:p>
@@ -2669,7 +2671,7 @@
           <a:p>
             <a:fld id="{74F2982F-AAE1-4ADA-A725-0A5C19CD442F}" type="slidenum">
               <a:rPr lang="en-US" smtClean="0"/>
-              <a:t>21</a:t>
+              <a:t>22</a:t>
             </a:fld>
             <a:endParaRPr lang="en-US"/>
           </a:p>
@@ -2830,7 +2832,7 @@
           <a:p>
             <a:fld id="{2DFDA5C7-BBAE-481E-8BF7-731156A2E2C1}" type="datetime8">
               <a:rPr lang="en-US" smtClean="0"/>
-              <a:t>12/11/2014 10:19 AM</a:t>
+              <a:t>1/30/2015 1:17 AM</a:t>
             </a:fld>
             <a:endParaRPr lang="en-US" dirty="0"/>
           </a:p>
@@ -2854,7 +2856,7 @@
             <a:fld id="{B4008EB6-D09E-4580-8CD6-DDB14511944F}" type="slidenum">
               <a:rPr lang="en-US" smtClean="0"/>
               <a:pPr/>
-              <a:t>22</a:t>
+              <a:t>23</a:t>
             </a:fld>
             <a:endParaRPr lang="en-US" dirty="0"/>
           </a:p>
@@ -3015,7 +3017,7 @@
           <a:p>
             <a:fld id="{2DFDA5C7-BBAE-481E-8BF7-731156A2E2C1}" type="datetime8">
               <a:rPr lang="en-US" smtClean="0"/>
-              <a:t>12/11/2014 10:19 AM</a:t>
+              <a:t>1/30/2015 1:17 AM</a:t>
             </a:fld>
             <a:endParaRPr lang="en-US" dirty="0"/>
           </a:p>
@@ -3039,7 +3041,7 @@
             <a:fld id="{B4008EB6-D09E-4580-8CD6-DDB14511944F}" type="slidenum">
               <a:rPr lang="en-US" smtClean="0"/>
               <a:pPr/>
-              <a:t>23</a:t>
+              <a:t>24</a:t>
             </a:fld>
             <a:endParaRPr lang="en-US" dirty="0"/>
           </a:p>
@@ -3208,7 +3210,7 @@
           <a:p>
             <a:fld id="{2DFDA5C7-BBAE-481E-8BF7-731156A2E2C1}" type="datetime8">
               <a:rPr lang="en-US" smtClean="0"/>
-              <a:t>12/11/2014 10:19 AM</a:t>
+              <a:t>1/30/2015 1:17 AM</a:t>
             </a:fld>
             <a:endParaRPr lang="en-US" dirty="0"/>
           </a:p>
@@ -3232,7 +3234,7 @@
             <a:fld id="{B4008EB6-D09E-4580-8CD6-DDB14511944F}" type="slidenum">
               <a:rPr lang="en-US" smtClean="0"/>
               <a:pPr/>
-              <a:t>24</a:t>
+              <a:t>25</a:t>
             </a:fld>
             <a:endParaRPr lang="en-US" dirty="0"/>
           </a:p>
@@ -3393,7 +3395,7 @@
           <a:p>
             <a:fld id="{2DFDA5C7-BBAE-481E-8BF7-731156A2E2C1}" type="datetime8">
               <a:rPr lang="en-US" smtClean="0"/>
-              <a:t>12/11/2014 10:19 AM</a:t>
+              <a:t>1/30/2015 1:17 AM</a:t>
             </a:fld>
             <a:endParaRPr lang="en-US" dirty="0"/>
           </a:p>
@@ -3417,7 +3419,7 @@
             <a:fld id="{B4008EB6-D09E-4580-8CD6-DDB14511944F}" type="slidenum">
               <a:rPr lang="en-US" smtClean="0"/>
               <a:pPr/>
-              <a:t>25</a:t>
+              <a:t>26</a:t>
             </a:fld>
             <a:endParaRPr lang="en-US" dirty="0"/>
           </a:p>
@@ -3578,7 +3580,7 @@
           <a:p>
             <a:fld id="{2DFDA5C7-BBAE-481E-8BF7-731156A2E2C1}" type="datetime8">
               <a:rPr lang="en-US" smtClean="0"/>
-              <a:t>12/11/2014 10:19 AM</a:t>
+              <a:t>1/30/2015 1:17 AM</a:t>
             </a:fld>
             <a:endParaRPr lang="en-US" dirty="0"/>
           </a:p>
@@ -3602,7 +3604,7 @@
             <a:fld id="{B4008EB6-D09E-4580-8CD6-DDB14511944F}" type="slidenum">
               <a:rPr lang="en-US" smtClean="0"/>
               <a:pPr/>
-              <a:t>26</a:t>
+              <a:t>27</a:t>
             </a:fld>
             <a:endParaRPr lang="en-US" dirty="0"/>
           </a:p>
@@ -3763,7 +3765,7 @@
           <a:p>
             <a:fld id="{2DFDA5C7-BBAE-481E-8BF7-731156A2E2C1}" type="datetime8">
               <a:rPr lang="en-US" smtClean="0"/>
-              <a:t>12/11/2014 10:19 AM</a:t>
+              <a:t>1/30/2015 1:17 AM</a:t>
             </a:fld>
             <a:endParaRPr lang="en-US" dirty="0"/>
           </a:p>
@@ -3787,7 +3789,7 @@
             <a:fld id="{B4008EB6-D09E-4580-8CD6-DDB14511944F}" type="slidenum">
               <a:rPr lang="en-US" smtClean="0"/>
               <a:pPr/>
-              <a:t>27</a:t>
+              <a:t>28</a:t>
             </a:fld>
             <a:endParaRPr lang="en-US" dirty="0"/>
           </a:p>
@@ -3983,7 +3985,7 @@
                 </a:solidFill>
               </a:rPr>
               <a:pPr/>
-              <a:t>12/11/2014</a:t>
+              <a:t>1/30/2015</a:t>
             </a:fld>
             <a:endParaRPr lang="en-US" dirty="0">
               <a:solidFill>
@@ -4015,7 +4017,7 @@
                 </a:solidFill>
               </a:rPr>
               <a:pPr/>
-              <a:t>28</a:t>
+              <a:t>29</a:t>
             </a:fld>
             <a:endParaRPr lang="en-US" dirty="0">
               <a:solidFill>
@@ -8962,7 +8964,7 @@
           <a:graphicData uri="http://schemas.openxmlformats.org/presentationml/2006/ole">
             <mc:AlternateContent xmlns:mc="http://schemas.openxmlformats.org/markup-compatibility/2006">
               <mc:Choice xmlns:v="urn:schemas-microsoft-com:vml" Requires="v">
-                <p:oleObj spid="_x0000_s1060" name="think-cell Slide" r:id="rId7" imgW="270" imgH="270" progId="TCLayout.ActiveDocument.1">
+                <p:oleObj spid="_x0000_s1061" name="think-cell Slide" r:id="rId7" imgW="270" imgH="270" progId="TCLayout.ActiveDocument.1">
                   <p:embed/>
                 </p:oleObj>
               </mc:Choice>
@@ -10179,7 +10181,7 @@
           <a:graphicData uri="http://schemas.openxmlformats.org/presentationml/2006/ole">
             <mc:AlternateContent xmlns:mc="http://schemas.openxmlformats.org/markup-compatibility/2006">
               <mc:Choice xmlns:v="urn:schemas-microsoft-com:vml" Requires="v">
-                <p:oleObj spid="_x0000_s2081" name="think-cell Slide" r:id="rId6" imgW="270" imgH="270" progId="TCLayout.ActiveDocument.1">
+                <p:oleObj spid="_x0000_s2082" name="think-cell Slide" r:id="rId6" imgW="270" imgH="270" progId="TCLayout.ActiveDocument.1">
                   <p:embed/>
                 </p:oleObj>
               </mc:Choice>
@@ -11371,7 +11373,7 @@
           <a:graphicData uri="http://schemas.openxmlformats.org/presentationml/2006/ole">
             <mc:AlternateContent xmlns:mc="http://schemas.openxmlformats.org/markup-compatibility/2006">
               <mc:Choice xmlns:v="urn:schemas-microsoft-com:vml" Requires="v">
-                <p:oleObj spid="_x0000_s3104" name="think-cell Slide" r:id="rId6" imgW="270" imgH="270" progId="TCLayout.ActiveDocument.1">
+                <p:oleObj spid="_x0000_s3105" name="think-cell Slide" r:id="rId6" imgW="270" imgH="270" progId="TCLayout.ActiveDocument.1">
                   <p:embed/>
                 </p:oleObj>
               </mc:Choice>
@@ -12855,7 +12857,7 @@
           <a:graphicData uri="http://schemas.openxmlformats.org/presentationml/2006/ole">
             <mc:AlternateContent xmlns:mc="http://schemas.openxmlformats.org/markup-compatibility/2006">
               <mc:Choice xmlns:v="urn:schemas-microsoft-com:vml" Requires="v">
-                <p:oleObj spid="_x0000_s6171" name="think-cell Slide" r:id="rId5" imgW="270" imgH="270" progId="TCLayout.ActiveDocument.1">
+                <p:oleObj spid="_x0000_s6172" name="think-cell Slide" r:id="rId5" imgW="270" imgH="270" progId="TCLayout.ActiveDocument.1">
                   <p:embed/>
                 </p:oleObj>
               </mc:Choice>
@@ -13291,6 +13293,286 @@
 </file>
 
 <file path=ppt/slides/slide18.xml><?xml version="1.0" encoding="utf-8"?>
+<p:sld xmlns:a="http://schemas.openxmlformats.org/drawingml/2006/main" xmlns:r="http://schemas.openxmlformats.org/officeDocument/2006/relationships" xmlns:p="http://schemas.openxmlformats.org/presentationml/2006/main">
+  <p:cSld>
+    <p:spTree>
+      <p:nvGrpSpPr>
+        <p:cNvPr id="1" name=""/>
+        <p:cNvGrpSpPr/>
+        <p:nvPr/>
+      </p:nvGrpSpPr>
+      <p:grpSpPr>
+        <a:xfrm>
+          <a:off x="0" y="0"/>
+          <a:ext cx="0" cy="0"/>
+          <a:chOff x="0" y="0"/>
+          <a:chExt cx="0" cy="0"/>
+        </a:xfrm>
+      </p:grpSpPr>
+      <p:sp>
+        <p:nvSpPr>
+          <p:cNvPr id="2" name="Title 1"/>
+          <p:cNvSpPr>
+            <a:spLocks noGrp="1"/>
+          </p:cNvSpPr>
+          <p:nvPr>
+            <p:ph type="title"/>
+          </p:nvPr>
+        </p:nvSpPr>
+        <p:spPr/>
+        <p:txBody>
+          <a:bodyPr>
+            <a:normAutofit fontScale="90000"/>
+          </a:bodyPr>
+          <a:lstStyle/>
+          <a:p>
+            <a:r>
+              <a:rPr lang="en-US" dirty="0">
+                <a:solidFill>
+                  <a:schemeClr val="bg1"/>
+                </a:solidFill>
+              </a:rPr>
+              <a:t>Integrated development experience powered by Visual Studio + Azure SDK</a:t>
+            </a:r>
+          </a:p>
+        </p:txBody>
+      </p:sp>
+      <p:sp>
+        <p:nvSpPr>
+          <p:cNvPr id="3" name="Content Placeholder 2"/>
+          <p:cNvSpPr>
+            <a:spLocks noGrp="1"/>
+          </p:cNvSpPr>
+          <p:nvPr>
+            <p:ph sz="quarter" idx="10"/>
+          </p:nvPr>
+        </p:nvSpPr>
+        <p:spPr>
+          <a:xfrm>
+            <a:off x="519249" y="2066104"/>
+            <a:ext cx="7602776" cy="4538678"/>
+          </a:xfrm>
+        </p:spPr>
+        <p:txBody>
+          <a:bodyPr/>
+          <a:lstStyle/>
+          <a:p>
+            <a:r>
+              <a:rPr lang="en-US" sz="2800" dirty="0" smtClean="0"/>
+              <a:t>Development </a:t>
+            </a:r>
+            <a:r>
+              <a:rPr lang="en-US" sz="2800" dirty="0"/>
+              <a:t>experience using the </a:t>
+            </a:r>
+            <a:r>
+              <a:rPr lang="en-US" sz="2900" dirty="0">
+                <a:solidFill>
+                  <a:srgbClr val="FFC000"/>
+                </a:solidFill>
+              </a:rPr>
+              <a:t>Azure SDK</a:t>
+            </a:r>
+            <a:r>
+              <a:rPr lang="en-US" sz="2800" dirty="0"/>
+              <a:t>, integrated seamlessly with </a:t>
+            </a:r>
+            <a:r>
+              <a:rPr lang="en-US" sz="2900" dirty="0">
+                <a:solidFill>
+                  <a:srgbClr val="FFC000"/>
+                </a:solidFill>
+              </a:rPr>
+              <a:t>Visual Studio</a:t>
+            </a:r>
+            <a:r>
+              <a:rPr lang="en-US" sz="2800" dirty="0" smtClean="0"/>
+              <a:t>.</a:t>
+            </a:r>
+          </a:p>
+          <a:p>
+            <a:endParaRPr lang="en-US" sz="2800" dirty="0" smtClean="0"/>
+          </a:p>
+          <a:p>
+            <a:r>
+              <a:rPr lang="en-US" sz="2800" dirty="0" smtClean="0"/>
+              <a:t>Deploy </a:t>
+            </a:r>
+            <a:r>
+              <a:rPr lang="en-US" sz="2800" dirty="0"/>
+              <a:t>using </a:t>
+            </a:r>
+            <a:r>
+              <a:rPr lang="en-US" sz="2900" dirty="0">
+                <a:solidFill>
+                  <a:srgbClr val="FFC000"/>
+                </a:solidFill>
+              </a:rPr>
+              <a:t>any language </a:t>
+            </a:r>
+            <a:r>
+              <a:rPr lang="en-US" sz="2800" dirty="0"/>
+              <a:t>you like, including </a:t>
+            </a:r>
+            <a:r>
+              <a:rPr lang="en-US" sz="2900" dirty="0">
+                <a:solidFill>
+                  <a:srgbClr val="FFC000"/>
+                </a:solidFill>
+              </a:rPr>
+              <a:t>.NET</a:t>
+            </a:r>
+            <a:r>
+              <a:rPr lang="en-US" sz="2800" dirty="0"/>
+              <a:t>, </a:t>
+            </a:r>
+            <a:r>
+              <a:rPr lang="en-US" sz="2900" dirty="0">
+                <a:solidFill>
+                  <a:srgbClr val="FFC000"/>
+                </a:solidFill>
+              </a:rPr>
+              <a:t>Java</a:t>
+            </a:r>
+            <a:r>
+              <a:rPr lang="en-US" sz="2800" dirty="0"/>
+              <a:t>, </a:t>
+            </a:r>
+            <a:r>
+              <a:rPr lang="en-US" sz="2900" dirty="0">
+                <a:solidFill>
+                  <a:srgbClr val="FFC000"/>
+                </a:solidFill>
+              </a:rPr>
+              <a:t>Node.js</a:t>
+            </a:r>
+            <a:r>
+              <a:rPr lang="en-US" sz="2800" dirty="0"/>
+              <a:t>, </a:t>
+            </a:r>
+            <a:r>
+              <a:rPr lang="en-US" sz="2900" dirty="0">
+                <a:solidFill>
+                  <a:srgbClr val="FFC000"/>
+                </a:solidFill>
+              </a:rPr>
+              <a:t>PHP</a:t>
+            </a:r>
+            <a:r>
+              <a:rPr lang="en-US" sz="2800" dirty="0"/>
+              <a:t>, </a:t>
+            </a:r>
+            <a:r>
+              <a:rPr lang="en-US" sz="2900" dirty="0">
+                <a:solidFill>
+                  <a:srgbClr val="FFC000"/>
+                </a:solidFill>
+              </a:rPr>
+              <a:t>Python</a:t>
+            </a:r>
+            <a:r>
+              <a:rPr lang="en-US" sz="2800" dirty="0"/>
+              <a:t>, or </a:t>
+            </a:r>
+            <a:r>
+              <a:rPr lang="en-US" sz="2900" dirty="0">
+                <a:solidFill>
+                  <a:srgbClr val="FFC000"/>
+                </a:solidFill>
+              </a:rPr>
+              <a:t>Ruby</a:t>
+            </a:r>
+            <a:r>
+              <a:rPr lang="en-US" sz="2800" dirty="0" smtClean="0"/>
+              <a:t>.</a:t>
+            </a:r>
+          </a:p>
+          <a:p>
+            <a:endParaRPr lang="en-US" sz="2800" dirty="0" smtClean="0"/>
+          </a:p>
+          <a:p>
+            <a:r>
+              <a:rPr lang="en-US" sz="2900" dirty="0">
+                <a:solidFill>
+                  <a:srgbClr val="FFC000"/>
+                </a:solidFill>
+              </a:rPr>
+              <a:t>Test </a:t>
+            </a:r>
+            <a:r>
+              <a:rPr lang="en-US" sz="2900" dirty="0">
+                <a:solidFill>
+                  <a:srgbClr val="FFC000"/>
+                </a:solidFill>
+              </a:rPr>
+              <a:t>your application </a:t>
+            </a:r>
+            <a:r>
+              <a:rPr lang="en-US" sz="2800" dirty="0"/>
+              <a:t>before deploying to the cloud using the </a:t>
+            </a:r>
+            <a:r>
+              <a:rPr lang="en-US" sz="2900" dirty="0">
+                <a:solidFill>
+                  <a:srgbClr val="FFC000"/>
+                </a:solidFill>
+              </a:rPr>
+              <a:t>Azure Emulator</a:t>
+            </a:r>
+            <a:r>
+              <a:rPr lang="en-US" sz="2800" dirty="0"/>
+              <a:t>, which brings the platform’s key functionality right to your dev machine. </a:t>
+            </a:r>
+          </a:p>
+        </p:txBody>
+      </p:sp>
+      <p:pic>
+        <p:nvPicPr>
+          <p:cNvPr id="4" name="Picture 3"/>
+          <p:cNvPicPr>
+            <a:picLocks noChangeAspect="1"/>
+          </p:cNvPicPr>
+          <p:nvPr/>
+        </p:nvPicPr>
+        <p:blipFill>
+          <a:blip r:embed="rId2">
+            <a:extLst>
+              <a:ext uri="{28A0092B-C50C-407E-A947-70E740481C1C}">
+                <a14:useLocalDpi xmlns:a14="http://schemas.microsoft.com/office/drawing/2010/main" val="0"/>
+              </a:ext>
+            </a:extLst>
+          </a:blip>
+          <a:stretch>
+            <a:fillRect/>
+          </a:stretch>
+        </p:blipFill>
+        <p:spPr>
+          <a:xfrm>
+            <a:off x="8383795" y="2607607"/>
+            <a:ext cx="3922954" cy="2521900"/>
+          </a:xfrm>
+          <a:prstGeom prst="rect">
+            <a:avLst/>
+          </a:prstGeom>
+        </p:spPr>
+      </p:pic>
+    </p:spTree>
+    <p:extLst>
+      <p:ext uri="{BB962C8B-B14F-4D97-AF65-F5344CB8AC3E}">
+        <p14:creationId xmlns:p14="http://schemas.microsoft.com/office/powerpoint/2010/main" val="122176672"/>
+      </p:ext>
+    </p:extLst>
+  </p:cSld>
+  <p:clrMapOvr>
+    <a:masterClrMapping/>
+  </p:clrMapOvr>
+  <p:transition>
+    <p:fade/>
+  </p:transition>
+</p:sld>
+</file>
+
+<file path=ppt/slides/slide19.xml><?xml version="1.0" encoding="utf-8"?>
 <p:sld xmlns:a="http://schemas.openxmlformats.org/drawingml/2006/main" xmlns:r="http://schemas.openxmlformats.org/officeDocument/2006/relationships" xmlns:p="http://schemas.openxmlformats.org/presentationml/2006/main">
   <p:cSld>
     <p:spTree>
@@ -13481,86 +13763,6 @@
     <p:bldLst>
       <p:bldP spid="3" grpId="0" build="p"/>
     </p:bldLst>
-  </p:timing>
-</p:sld>
-</file>
-
-<file path=ppt/slides/slide19.xml><?xml version="1.0" encoding="utf-8"?>
-<p:sld xmlns:a="http://schemas.openxmlformats.org/drawingml/2006/main" xmlns:r="http://schemas.openxmlformats.org/officeDocument/2006/relationships" xmlns:p="http://schemas.openxmlformats.org/presentationml/2006/main">
-  <p:cSld>
-    <p:spTree>
-      <p:nvGrpSpPr>
-        <p:cNvPr id="1" name=""/>
-        <p:cNvGrpSpPr/>
-        <p:nvPr/>
-      </p:nvGrpSpPr>
-      <p:grpSpPr>
-        <a:xfrm>
-          <a:off x="0" y="0"/>
-          <a:ext cx="0" cy="0"/>
-          <a:chOff x="0" y="0"/>
-          <a:chExt cx="0" cy="0"/>
-        </a:xfrm>
-      </p:grpSpPr>
-      <p:sp>
-        <p:nvSpPr>
-          <p:cNvPr id="2" name="Title 1"/>
-          <p:cNvSpPr>
-            <a:spLocks noGrp="1"/>
-          </p:cNvSpPr>
-          <p:nvPr>
-            <p:ph type="ctrTitle"/>
-          </p:nvPr>
-        </p:nvSpPr>
-        <p:spPr/>
-        <p:txBody>
-          <a:bodyPr/>
-          <a:lstStyle/>
-          <a:p>
-            <a:r>
-              <a:rPr lang="en-US" altLang="zh-CN" sz="13800" dirty="0" smtClean="0">
-                <a:solidFill>
-                  <a:schemeClr val="bg1"/>
-                </a:solidFill>
-              </a:rPr>
-              <a:t>Design for Cloud</a:t>
-            </a:r>
-            <a:endParaRPr lang="en-US" sz="13800" dirty="0">
-              <a:solidFill>
-                <a:schemeClr val="bg1"/>
-              </a:solidFill>
-            </a:endParaRPr>
-          </a:p>
-        </p:txBody>
-      </p:sp>
-    </p:spTree>
-    <p:extLst>
-      <p:ext uri="{BB962C8B-B14F-4D97-AF65-F5344CB8AC3E}">
-        <p14:creationId xmlns:p14="http://schemas.microsoft.com/office/powerpoint/2010/main" val="1988179541"/>
-      </p:ext>
-    </p:extLst>
-  </p:cSld>
-  <p:clrMapOvr>
-    <a:masterClrMapping/>
-  </p:clrMapOvr>
-  <mc:AlternateContent xmlns:mc="http://schemas.openxmlformats.org/markup-compatibility/2006" xmlns:p14="http://schemas.microsoft.com/office/powerpoint/2010/main">
-    <mc:Choice Requires="p14">
-      <p:transition spd="med" p14:dur="700">
-        <p:fade/>
-      </p:transition>
-    </mc:Choice>
-    <mc:Fallback xmlns="">
-      <p:transition spd="med">
-        <p:fade/>
-      </p:transition>
-    </mc:Fallback>
-  </mc:AlternateContent>
-  <p:timing>
-    <p:tnLst>
-      <p:par>
-        <p:cTn id="1" dur="indefinite" restart="never" nodeType="tmRoot"/>
-      </p:par>
-    </p:tnLst>
   </p:timing>
 </p:sld>
 </file>
@@ -13980,6 +14182,86 @@
       </p:grpSpPr>
       <p:sp>
         <p:nvSpPr>
+          <p:cNvPr id="2" name="Title 1"/>
+          <p:cNvSpPr>
+            <a:spLocks noGrp="1"/>
+          </p:cNvSpPr>
+          <p:nvPr>
+            <p:ph type="ctrTitle"/>
+          </p:nvPr>
+        </p:nvSpPr>
+        <p:spPr/>
+        <p:txBody>
+          <a:bodyPr/>
+          <a:lstStyle/>
+          <a:p>
+            <a:r>
+              <a:rPr lang="en-US" altLang="zh-CN" sz="13800" dirty="0" smtClean="0">
+                <a:solidFill>
+                  <a:schemeClr val="bg1"/>
+                </a:solidFill>
+              </a:rPr>
+              <a:t>Design for Cloud</a:t>
+            </a:r>
+            <a:endParaRPr lang="en-US" sz="13800" dirty="0">
+              <a:solidFill>
+                <a:schemeClr val="bg1"/>
+              </a:solidFill>
+            </a:endParaRPr>
+          </a:p>
+        </p:txBody>
+      </p:sp>
+    </p:spTree>
+    <p:extLst>
+      <p:ext uri="{BB962C8B-B14F-4D97-AF65-F5344CB8AC3E}">
+        <p14:creationId xmlns:p14="http://schemas.microsoft.com/office/powerpoint/2010/main" val="1988179541"/>
+      </p:ext>
+    </p:extLst>
+  </p:cSld>
+  <p:clrMapOvr>
+    <a:masterClrMapping/>
+  </p:clrMapOvr>
+  <mc:AlternateContent xmlns:mc="http://schemas.openxmlformats.org/markup-compatibility/2006" xmlns:p14="http://schemas.microsoft.com/office/powerpoint/2010/main">
+    <mc:Choice Requires="p14">
+      <p:transition spd="med" p14:dur="700">
+        <p:fade/>
+      </p:transition>
+    </mc:Choice>
+    <mc:Fallback xmlns="">
+      <p:transition spd="med">
+        <p:fade/>
+      </p:transition>
+    </mc:Fallback>
+  </mc:AlternateContent>
+  <p:timing>
+    <p:tnLst>
+      <p:par>
+        <p:cTn id="1" dur="indefinite" restart="never" nodeType="tmRoot"/>
+      </p:par>
+    </p:tnLst>
+  </p:timing>
+</p:sld>
+</file>
+
+<file path=ppt/slides/slide21.xml><?xml version="1.0" encoding="utf-8"?>
+<p:sld xmlns:a="http://schemas.openxmlformats.org/drawingml/2006/main" xmlns:r="http://schemas.openxmlformats.org/officeDocument/2006/relationships" xmlns:p="http://schemas.openxmlformats.org/presentationml/2006/main">
+  <p:cSld>
+    <p:spTree>
+      <p:nvGrpSpPr>
+        <p:cNvPr id="1" name=""/>
+        <p:cNvGrpSpPr/>
+        <p:nvPr/>
+      </p:nvGrpSpPr>
+      <p:grpSpPr>
+        <a:xfrm>
+          <a:off x="0" y="0"/>
+          <a:ext cx="0" cy="0"/>
+          <a:chOff x="0" y="0"/>
+          <a:chExt cx="0" cy="0"/>
+        </a:xfrm>
+      </p:grpSpPr>
+      <p:sp>
+        <p:nvSpPr>
           <p:cNvPr id="5" name="Title 4"/>
           <p:cNvSpPr>
             <a:spLocks noGrp="1"/>
@@ -14361,7 +14643,7 @@
 </p:sld>
 </file>
 
-<file path=ppt/slides/slide21.xml><?xml version="1.0" encoding="utf-8"?>
+<file path=ppt/slides/slide22.xml><?xml version="1.0" encoding="utf-8"?>
 <p:sld xmlns:a="http://schemas.openxmlformats.org/drawingml/2006/main" xmlns:r="http://schemas.openxmlformats.org/officeDocument/2006/relationships" xmlns:p="http://schemas.openxmlformats.org/presentationml/2006/main">
   <p:cSld>
     <p:spTree>
@@ -20535,7 +20817,7 @@
 </p:sld>
 </file>
 
-<file path=ppt/slides/slide22.xml><?xml version="1.0" encoding="utf-8"?>
+<file path=ppt/slides/slide23.xml><?xml version="1.0" encoding="utf-8"?>
 <p:sld xmlns:a="http://schemas.openxmlformats.org/drawingml/2006/main" xmlns:r="http://schemas.openxmlformats.org/officeDocument/2006/relationships" xmlns:p="http://schemas.openxmlformats.org/presentationml/2006/main">
   <p:cSld>
     <p:spTree>
@@ -21133,7 +21415,7 @@
 </p:sld>
 </file>
 
-<file path=ppt/slides/slide23.xml><?xml version="1.0" encoding="utf-8"?>
+<file path=ppt/slides/slide24.xml><?xml version="1.0" encoding="utf-8"?>
 <p:sld xmlns:a="http://schemas.openxmlformats.org/drawingml/2006/main" xmlns:r="http://schemas.openxmlformats.org/officeDocument/2006/relationships" xmlns:p="http://schemas.openxmlformats.org/presentationml/2006/main">
   <p:cSld>
     <p:spTree>
@@ -21798,7 +22080,7 @@
 </p:sld>
 </file>
 
-<file path=ppt/slides/slide24.xml><?xml version="1.0" encoding="utf-8"?>
+<file path=ppt/slides/slide25.xml><?xml version="1.0" encoding="utf-8"?>
 <p:sld xmlns:a="http://schemas.openxmlformats.org/drawingml/2006/main" xmlns:r="http://schemas.openxmlformats.org/officeDocument/2006/relationships" xmlns:p="http://schemas.openxmlformats.org/presentationml/2006/main">
   <p:cSld>
     <p:spTree>
@@ -23022,7 +23304,7 @@
 </p:sld>
 </file>
 
-<file path=ppt/slides/slide25.xml><?xml version="1.0" encoding="utf-8"?>
+<file path=ppt/slides/slide26.xml><?xml version="1.0" encoding="utf-8"?>
 <p:sld xmlns:a="http://schemas.openxmlformats.org/drawingml/2006/main" xmlns:r="http://schemas.openxmlformats.org/officeDocument/2006/relationships" xmlns:p="http://schemas.openxmlformats.org/presentationml/2006/main" show="0">
   <p:cSld>
     <p:spTree>
@@ -25034,7 +25316,7 @@
 </p:sld>
 </file>
 
-<file path=ppt/slides/slide26.xml><?xml version="1.0" encoding="utf-8"?>
+<file path=ppt/slides/slide27.xml><?xml version="1.0" encoding="utf-8"?>
 <p:sld xmlns:a="http://schemas.openxmlformats.org/drawingml/2006/main" xmlns:r="http://schemas.openxmlformats.org/officeDocument/2006/relationships" xmlns:p="http://schemas.openxmlformats.org/presentationml/2006/main" show="0">
   <p:cSld>
     <p:spTree>
@@ -27830,7 +28112,7 @@
 </p:sld>
 </file>
 
-<file path=ppt/slides/slide27.xml><?xml version="1.0" encoding="utf-8"?>
+<file path=ppt/slides/slide28.xml><?xml version="1.0" encoding="utf-8"?>
 <p:sld xmlns:a="http://schemas.openxmlformats.org/drawingml/2006/main" xmlns:r="http://schemas.openxmlformats.org/officeDocument/2006/relationships" xmlns:p="http://schemas.openxmlformats.org/presentationml/2006/main">
   <p:cSld>
     <p:spTree>
@@ -28376,7 +28658,7 @@
 </p:sld>
 </file>
 
-<file path=ppt/slides/slide28.xml><?xml version="1.0" encoding="utf-8"?>
+<file path=ppt/slides/slide29.xml><?xml version="1.0" encoding="utf-8"?>
 <p:sld xmlns:a="http://schemas.openxmlformats.org/drawingml/2006/main" xmlns:r="http://schemas.openxmlformats.org/officeDocument/2006/relationships" xmlns:p="http://schemas.openxmlformats.org/presentationml/2006/main">
   <p:cSld>
     <p:spTree>
@@ -29149,55 +29431,6 @@
 </p:sld>
 </file>
 
-<file path=ppt/slides/slide29.xml><?xml version="1.0" encoding="utf-8"?>
-<p:sld xmlns:a="http://schemas.openxmlformats.org/drawingml/2006/main" xmlns:r="http://schemas.openxmlformats.org/officeDocument/2006/relationships" xmlns:p="http://schemas.openxmlformats.org/presentationml/2006/main">
-  <p:cSld>
-    <p:spTree>
-      <p:nvGrpSpPr>
-        <p:cNvPr id="1" name=""/>
-        <p:cNvGrpSpPr/>
-        <p:nvPr/>
-      </p:nvGrpSpPr>
-      <p:grpSpPr>
-        <a:xfrm>
-          <a:off x="0" y="0"/>
-          <a:ext cx="0" cy="0"/>
-          <a:chOff x="0" y="0"/>
-          <a:chExt cx="0" cy="0"/>
-        </a:xfrm>
-      </p:grpSpPr>
-    </p:spTree>
-    <p:extLst>
-      <p:ext uri="{BB962C8B-B14F-4D97-AF65-F5344CB8AC3E}">
-        <p14:creationId xmlns:p14="http://schemas.microsoft.com/office/powerpoint/2010/main" val="981978785"/>
-      </p:ext>
-    </p:extLst>
-  </p:cSld>
-  <p:clrMapOvr>
-    <a:masterClrMapping/>
-  </p:clrMapOvr>
-  <mc:AlternateContent xmlns:mc="http://schemas.openxmlformats.org/markup-compatibility/2006" xmlns:p14="http://schemas.microsoft.com/office/powerpoint/2010/main">
-    <mc:Choice Requires="p14">
-      <p:transition spd="med" p14:dur="700">
-        <p:fade/>
-      </p:transition>
-    </mc:Choice>
-    <mc:Fallback xmlns="">
-      <p:transition spd="med">
-        <p:fade/>
-      </p:transition>
-    </mc:Fallback>
-  </mc:AlternateContent>
-  <p:timing>
-    <p:tnLst>
-      <p:par>
-        <p:cTn id="1" dur="indefinite" restart="never" nodeType="tmRoot"/>
-      </p:par>
-    </p:tnLst>
-  </p:timing>
-</p:sld>
-</file>
-
 <file path=ppt/slides/slide3.xml><?xml version="1.0" encoding="utf-8"?>
 <p:sld xmlns:a="http://schemas.openxmlformats.org/drawingml/2006/main" xmlns:r="http://schemas.openxmlformats.org/officeDocument/2006/relationships" xmlns:p="http://schemas.openxmlformats.org/presentationml/2006/main">
   <p:cSld>
@@ -29263,15 +29496,7 @@
                   <a:prstClr val="white"/>
                 </a:solidFill>
               </a:rPr>
-              <a:t>The three ways to host your applications </a:t>
-            </a:r>
-            <a:r>
-              <a:rPr lang="en-US" sz="2800" dirty="0" smtClean="0">
-                <a:solidFill>
-                  <a:prstClr val="white"/>
-                </a:solidFill>
-              </a:rPr>
-              <a:t>on the Microsoft Azure Platform</a:t>
+              <a:t>The three ways to host your applications on the Microsoft Azure Platform</a:t>
             </a:r>
             <a:endParaRPr lang="en-US" sz="2800" dirty="0">
               <a:solidFill>
@@ -29542,12 +29767,61 @@
   <p:clrMapOvr>
     <a:masterClrMapping/>
   </p:clrMapOvr>
-  <mc:AlternateContent xmlns:mc="http://schemas.openxmlformats.org/markup-compatibility/2006">
-    <mc:Choice xmlns:p14="http://schemas.microsoft.com/office/powerpoint/2010/main" Requires="p14">
+  <mc:AlternateContent xmlns:mc="http://schemas.openxmlformats.org/markup-compatibility/2006" xmlns:p14="http://schemas.microsoft.com/office/powerpoint/2010/main">
+    <mc:Choice Requires="p14">
       <p:transition spd="slow" p14:dur="2000"/>
     </mc:Choice>
-    <mc:Fallback>
+    <mc:Fallback xmlns="">
       <p:transition spd="slow"/>
+    </mc:Fallback>
+  </mc:AlternateContent>
+  <p:timing>
+    <p:tnLst>
+      <p:par>
+        <p:cTn id="1" dur="indefinite" restart="never" nodeType="tmRoot"/>
+      </p:par>
+    </p:tnLst>
+  </p:timing>
+</p:sld>
+</file>
+
+<file path=ppt/slides/slide30.xml><?xml version="1.0" encoding="utf-8"?>
+<p:sld xmlns:a="http://schemas.openxmlformats.org/drawingml/2006/main" xmlns:r="http://schemas.openxmlformats.org/officeDocument/2006/relationships" xmlns:p="http://schemas.openxmlformats.org/presentationml/2006/main">
+  <p:cSld>
+    <p:spTree>
+      <p:nvGrpSpPr>
+        <p:cNvPr id="1" name=""/>
+        <p:cNvGrpSpPr/>
+        <p:nvPr/>
+      </p:nvGrpSpPr>
+      <p:grpSpPr>
+        <a:xfrm>
+          <a:off x="0" y="0"/>
+          <a:ext cx="0" cy="0"/>
+          <a:chOff x="0" y="0"/>
+          <a:chExt cx="0" cy="0"/>
+        </a:xfrm>
+      </p:grpSpPr>
+    </p:spTree>
+    <p:extLst>
+      <p:ext uri="{BB962C8B-B14F-4D97-AF65-F5344CB8AC3E}">
+        <p14:creationId xmlns:p14="http://schemas.microsoft.com/office/powerpoint/2010/main" val="981978785"/>
+      </p:ext>
+    </p:extLst>
+  </p:cSld>
+  <p:clrMapOvr>
+    <a:masterClrMapping/>
+  </p:clrMapOvr>
+  <mc:AlternateContent xmlns:mc="http://schemas.openxmlformats.org/markup-compatibility/2006" xmlns:p14="http://schemas.microsoft.com/office/powerpoint/2010/main">
+    <mc:Choice Requires="p14">
+      <p:transition spd="med" p14:dur="700">
+        <p:fade/>
+      </p:transition>
+    </mc:Choice>
+    <mc:Fallback xmlns="">
+      <p:transition spd="med">
+        <p:fade/>
+      </p:transition>
     </mc:Fallback>
   </mc:AlternateContent>
   <p:timing>
@@ -36477,7 +36751,7 @@
           <a:graphicData uri="http://schemas.openxmlformats.org/presentationml/2006/ole">
             <mc:AlternateContent xmlns:mc="http://schemas.openxmlformats.org/markup-compatibility/2006">
               <mc:Choice xmlns:v="urn:schemas-microsoft-com:vml" Requires="v">
-                <p:oleObj spid="_x0000_s7178" name="think-cell Slide" r:id="rId5" imgW="270" imgH="270" progId="TCLayout.ActiveDocument.1">
+                <p:oleObj spid="_x0000_s7179" name="think-cell Slide" r:id="rId5" imgW="270" imgH="270" progId="TCLayout.ActiveDocument.1">
                   <p:embed/>
                 </p:oleObj>
               </mc:Choice>
@@ -37494,17 +37768,12 @@
 </file>
 
 <file path=customXml/item1.xml><?xml version="1.0" encoding="utf-8"?>
-<p:properties xmlns:p="http://schemas.microsoft.com/office/2006/metadata/properties" xmlns:xsi="http://www.w3.org/2001/XMLSchema-instance" xmlns:pc="http://schemas.microsoft.com/office/infopath/2007/PartnerControls">
-  <documentManagement>
-    <SharedWithUsers xmlns="fee586e5-3c92-48eb-9898-42915e590ada">
-      <UserInfo>
-        <DisplayName>Rick Claus</DisplayName>
-        <AccountId>401</AccountId>
-        <AccountType/>
-      </UserInfo>
-    </SharedWithUsers>
-  </documentManagement>
-</p:properties>
+<?mso-contentType ?>
+<FormTemplates xmlns="http://schemas.microsoft.com/sharepoint/v3/contenttype/forms">
+  <Display>DocumentLibraryForm</Display>
+  <Edit>DocumentLibraryForm</Edit>
+  <New>DocumentLibraryForm</New>
+</FormTemplates>
 </file>
 
 <file path=customXml/item2.xml><?xml version="1.0" encoding="utf-8"?>
@@ -37648,26 +37917,23 @@
 </file>
 
 <file path=customXml/item3.xml><?xml version="1.0" encoding="utf-8"?>
-<?mso-contentType ?>
-<FormTemplates xmlns="http://schemas.microsoft.com/sharepoint/v3/contenttype/forms">
-  <Display>DocumentLibraryForm</Display>
-  <Edit>DocumentLibraryForm</Edit>
-  <New>DocumentLibraryForm</New>
-</FormTemplates>
+<p:properties xmlns:p="http://schemas.microsoft.com/office/2006/metadata/properties" xmlns:xsi="http://www.w3.org/2001/XMLSchema-instance" xmlns:pc="http://schemas.microsoft.com/office/infopath/2007/PartnerControls">
+  <documentManagement>
+    <SharedWithUsers xmlns="fee586e5-3c92-48eb-9898-42915e590ada">
+      <UserInfo>
+        <DisplayName>Rick Claus</DisplayName>
+        <AccountId>401</AccountId>
+        <AccountType/>
+      </UserInfo>
+    </SharedWithUsers>
+  </documentManagement>
+</p:properties>
 </file>
 
 <file path=customXml/itemProps1.xml><?xml version="1.0" encoding="utf-8"?>
-<ds:datastoreItem xmlns:ds="http://schemas.openxmlformats.org/officeDocument/2006/customXml" ds:itemID="{B030EFEA-9AEA-457C-BAA8-93C4281792F5}">
+<ds:datastoreItem xmlns:ds="http://schemas.openxmlformats.org/officeDocument/2006/customXml" ds:itemID="{14B32142-DE2C-423C-A302-95CAC214862A}">
   <ds:schemaRefs>
-    <ds:schemaRef ds:uri="http://purl.org/dc/terms/"/>
-    <ds:schemaRef ds:uri="http://schemas.openxmlformats.org/package/2006/metadata/core-properties"/>
-    <ds:schemaRef ds:uri="http://schemas.microsoft.com/office/2006/documentManagement/types"/>
-    <ds:schemaRef ds:uri="http://schemas.microsoft.com/office/infopath/2007/PartnerControls"/>
-    <ds:schemaRef ds:uri="http://purl.org/dc/elements/1.1/"/>
-    <ds:schemaRef ds:uri="http://schemas.microsoft.com/office/2006/metadata/properties"/>
-    <ds:schemaRef ds:uri="fee586e5-3c92-48eb-9898-42915e590ada"/>
-    <ds:schemaRef ds:uri="http://www.w3.org/XML/1998/namespace"/>
-    <ds:schemaRef ds:uri="http://purl.org/dc/dcmitype/"/>
+    <ds:schemaRef ds:uri="http://schemas.microsoft.com/sharepoint/v3/contenttype/forms"/>
   </ds:schemaRefs>
 </ds:datastoreItem>
 </file>
@@ -37691,9 +37957,17 @@
 </file>
 
 <file path=customXml/itemProps3.xml><?xml version="1.0" encoding="utf-8"?>
-<ds:datastoreItem xmlns:ds="http://schemas.openxmlformats.org/officeDocument/2006/customXml" ds:itemID="{14B32142-DE2C-423C-A302-95CAC214862A}">
+<ds:datastoreItem xmlns:ds="http://schemas.openxmlformats.org/officeDocument/2006/customXml" ds:itemID="{B030EFEA-9AEA-457C-BAA8-93C4281792F5}">
   <ds:schemaRefs>
-    <ds:schemaRef ds:uri="http://schemas.microsoft.com/sharepoint/v3/contenttype/forms"/>
+    <ds:schemaRef ds:uri="http://purl.org/dc/terms/"/>
+    <ds:schemaRef ds:uri="http://schemas.openxmlformats.org/package/2006/metadata/core-properties"/>
+    <ds:schemaRef ds:uri="http://schemas.microsoft.com/office/2006/documentManagement/types"/>
+    <ds:schemaRef ds:uri="http://schemas.microsoft.com/office/infopath/2007/PartnerControls"/>
+    <ds:schemaRef ds:uri="http://purl.org/dc/elements/1.1/"/>
+    <ds:schemaRef ds:uri="http://schemas.microsoft.com/office/2006/metadata/properties"/>
+    <ds:schemaRef ds:uri="fee586e5-3c92-48eb-9898-42915e590ada"/>
+    <ds:schemaRef ds:uri="http://www.w3.org/XML/1998/namespace"/>
+    <ds:schemaRef ds:uri="http://purl.org/dc/dcmitype/"/>
   </ds:schemaRefs>
 </ds:datastoreItem>
 </file>
</xml_diff>

<commit_message>
Added Java support to PaaS
</commit_message>
<xml_diff>
--- a/PaaS/Building Cloud Solutions.pptx
+++ b/PaaS/Building Cloud Solutions.pptx
@@ -5,7 +5,7 @@
     <p:sldMasterId id="2147483660" r:id="rId4"/>
   </p:sldMasterIdLst>
   <p:notesMasterIdLst>
-    <p:notesMasterId r:id="rId34"/>
+    <p:notesMasterId r:id="rId35"/>
   </p:notesMasterIdLst>
   <p:sldIdLst>
     <p:sldId id="256" r:id="rId5"/>
@@ -25,18 +25,19 @@
     <p:sldId id="530" r:id="rId19"/>
     <p:sldId id="531" r:id="rId20"/>
     <p:sldId id="545" r:id="rId21"/>
-    <p:sldId id="544" r:id="rId22"/>
-    <p:sldId id="553" r:id="rId23"/>
-    <p:sldId id="554" r:id="rId24"/>
-    <p:sldId id="556" r:id="rId25"/>
-    <p:sldId id="559" r:id="rId26"/>
-    <p:sldId id="560" r:id="rId27"/>
-    <p:sldId id="561" r:id="rId28"/>
-    <p:sldId id="563" r:id="rId29"/>
-    <p:sldId id="564" r:id="rId30"/>
-    <p:sldId id="562" r:id="rId31"/>
-    <p:sldId id="495" r:id="rId32"/>
-    <p:sldId id="454" r:id="rId33"/>
+    <p:sldId id="567" r:id="rId22"/>
+    <p:sldId id="544" r:id="rId23"/>
+    <p:sldId id="553" r:id="rId24"/>
+    <p:sldId id="554" r:id="rId25"/>
+    <p:sldId id="556" r:id="rId26"/>
+    <p:sldId id="559" r:id="rId27"/>
+    <p:sldId id="560" r:id="rId28"/>
+    <p:sldId id="561" r:id="rId29"/>
+    <p:sldId id="563" r:id="rId30"/>
+    <p:sldId id="564" r:id="rId31"/>
+    <p:sldId id="562" r:id="rId32"/>
+    <p:sldId id="495" r:id="rId33"/>
+    <p:sldId id="454" r:id="rId34"/>
   </p:sldIdLst>
   <p:sldSz cx="12192000" cy="6858000"/>
   <p:notesSz cx="7010400" cy="9296400"/>
@@ -161,6 +162,7 @@
             <p14:sldId id="530"/>
             <p14:sldId id="531"/>
             <p14:sldId id="545"/>
+            <p14:sldId id="567"/>
             <p14:sldId id="544"/>
             <p14:sldId id="553"/>
             <p14:sldId id="554"/>
@@ -278,7 +280,7 @@
           <a:p>
             <a:fld id="{9EB326D8-4C38-4835-91AB-B79CDC0B07B3}" type="datetimeFigureOut">
               <a:rPr lang="en-US" smtClean="0"/>
-              <a:t>12/11/2014</a:t>
+              <a:t>1/30/2015</a:t>
             </a:fld>
             <a:endParaRPr lang="en-US"/>
           </a:p>
@@ -2155,7 +2157,7 @@
           <a:p>
             <a:fld id="{2C52CFDC-D2D5-4B9F-BA75-89F771E01AEB}" type="slidenum">
               <a:rPr lang="en-US" smtClean="0"/>
-              <a:t>18</a:t>
+              <a:t>19</a:t>
             </a:fld>
             <a:endParaRPr lang="en-US"/>
           </a:p>
@@ -2239,7 +2241,7 @@
           <a:p>
             <a:fld id="{2C52CFDC-D2D5-4B9F-BA75-89F771E01AEB}" type="slidenum">
               <a:rPr lang="en-US" smtClean="0"/>
-              <a:t>19</a:t>
+              <a:t>20</a:t>
             </a:fld>
             <a:endParaRPr lang="en-US"/>
           </a:p>
@@ -2412,7 +2414,7 @@
           <a:p>
             <a:fld id="{2C52CFDC-D2D5-4B9F-BA75-89F771E01AEB}" type="slidenum">
               <a:rPr lang="en-US" smtClean="0"/>
-              <a:t>20</a:t>
+              <a:t>21</a:t>
             </a:fld>
             <a:endParaRPr lang="en-US"/>
           </a:p>
@@ -2669,7 +2671,7 @@
           <a:p>
             <a:fld id="{74F2982F-AAE1-4ADA-A725-0A5C19CD442F}" type="slidenum">
               <a:rPr lang="en-US" smtClean="0"/>
-              <a:t>21</a:t>
+              <a:t>22</a:t>
             </a:fld>
             <a:endParaRPr lang="en-US"/>
           </a:p>
@@ -2830,7 +2832,7 @@
           <a:p>
             <a:fld id="{2DFDA5C7-BBAE-481E-8BF7-731156A2E2C1}" type="datetime8">
               <a:rPr lang="en-US" smtClean="0"/>
-              <a:t>12/11/2014 10:19 AM</a:t>
+              <a:t>1/30/2015 1:17 AM</a:t>
             </a:fld>
             <a:endParaRPr lang="en-US" dirty="0"/>
           </a:p>
@@ -2854,7 +2856,7 @@
             <a:fld id="{B4008EB6-D09E-4580-8CD6-DDB14511944F}" type="slidenum">
               <a:rPr lang="en-US" smtClean="0"/>
               <a:pPr/>
-              <a:t>22</a:t>
+              <a:t>23</a:t>
             </a:fld>
             <a:endParaRPr lang="en-US" dirty="0"/>
           </a:p>
@@ -3015,7 +3017,7 @@
           <a:p>
             <a:fld id="{2DFDA5C7-BBAE-481E-8BF7-731156A2E2C1}" type="datetime8">
               <a:rPr lang="en-US" smtClean="0"/>
-              <a:t>12/11/2014 10:19 AM</a:t>
+              <a:t>1/30/2015 1:17 AM</a:t>
             </a:fld>
             <a:endParaRPr lang="en-US" dirty="0"/>
           </a:p>
@@ -3039,7 +3041,7 @@
             <a:fld id="{B4008EB6-D09E-4580-8CD6-DDB14511944F}" type="slidenum">
               <a:rPr lang="en-US" smtClean="0"/>
               <a:pPr/>
-              <a:t>23</a:t>
+              <a:t>24</a:t>
             </a:fld>
             <a:endParaRPr lang="en-US" dirty="0"/>
           </a:p>
@@ -3208,7 +3210,7 @@
           <a:p>
             <a:fld id="{2DFDA5C7-BBAE-481E-8BF7-731156A2E2C1}" type="datetime8">
               <a:rPr lang="en-US" smtClean="0"/>
-              <a:t>12/11/2014 10:19 AM</a:t>
+              <a:t>1/30/2015 1:17 AM</a:t>
             </a:fld>
             <a:endParaRPr lang="en-US" dirty="0"/>
           </a:p>
@@ -3232,7 +3234,7 @@
             <a:fld id="{B4008EB6-D09E-4580-8CD6-DDB14511944F}" type="slidenum">
               <a:rPr lang="en-US" smtClean="0"/>
               <a:pPr/>
-              <a:t>24</a:t>
+              <a:t>25</a:t>
             </a:fld>
             <a:endParaRPr lang="en-US" dirty="0"/>
           </a:p>
@@ -3393,7 +3395,7 @@
           <a:p>
             <a:fld id="{2DFDA5C7-BBAE-481E-8BF7-731156A2E2C1}" type="datetime8">
               <a:rPr lang="en-US" smtClean="0"/>
-              <a:t>12/11/2014 10:19 AM</a:t>
+              <a:t>1/30/2015 1:17 AM</a:t>
             </a:fld>
             <a:endParaRPr lang="en-US" dirty="0"/>
           </a:p>
@@ -3417,7 +3419,7 @@
             <a:fld id="{B4008EB6-D09E-4580-8CD6-DDB14511944F}" type="slidenum">
               <a:rPr lang="en-US" smtClean="0"/>
               <a:pPr/>
-              <a:t>25</a:t>
+              <a:t>26</a:t>
             </a:fld>
             <a:endParaRPr lang="en-US" dirty="0"/>
           </a:p>
@@ -3578,7 +3580,7 @@
           <a:p>
             <a:fld id="{2DFDA5C7-BBAE-481E-8BF7-731156A2E2C1}" type="datetime8">
               <a:rPr lang="en-US" smtClean="0"/>
-              <a:t>12/11/2014 10:19 AM</a:t>
+              <a:t>1/30/2015 1:17 AM</a:t>
             </a:fld>
             <a:endParaRPr lang="en-US" dirty="0"/>
           </a:p>
@@ -3602,7 +3604,7 @@
             <a:fld id="{B4008EB6-D09E-4580-8CD6-DDB14511944F}" type="slidenum">
               <a:rPr lang="en-US" smtClean="0"/>
               <a:pPr/>
-              <a:t>26</a:t>
+              <a:t>27</a:t>
             </a:fld>
             <a:endParaRPr lang="en-US" dirty="0"/>
           </a:p>
@@ -3763,7 +3765,7 @@
           <a:p>
             <a:fld id="{2DFDA5C7-BBAE-481E-8BF7-731156A2E2C1}" type="datetime8">
               <a:rPr lang="en-US" smtClean="0"/>
-              <a:t>12/11/2014 10:19 AM</a:t>
+              <a:t>1/30/2015 1:17 AM</a:t>
             </a:fld>
             <a:endParaRPr lang="en-US" dirty="0"/>
           </a:p>
@@ -3787,7 +3789,7 @@
             <a:fld id="{B4008EB6-D09E-4580-8CD6-DDB14511944F}" type="slidenum">
               <a:rPr lang="en-US" smtClean="0"/>
               <a:pPr/>
-              <a:t>27</a:t>
+              <a:t>28</a:t>
             </a:fld>
             <a:endParaRPr lang="en-US" dirty="0"/>
           </a:p>
@@ -3983,7 +3985,7 @@
                 </a:solidFill>
               </a:rPr>
               <a:pPr/>
-              <a:t>12/11/2014</a:t>
+              <a:t>1/30/2015</a:t>
             </a:fld>
             <a:endParaRPr lang="en-US" dirty="0">
               <a:solidFill>
@@ -4015,7 +4017,7 @@
                 </a:solidFill>
               </a:rPr>
               <a:pPr/>
-              <a:t>28</a:t>
+              <a:t>29</a:t>
             </a:fld>
             <a:endParaRPr lang="en-US" dirty="0">
               <a:solidFill>
@@ -8962,7 +8964,7 @@
           <a:graphicData uri="http://schemas.openxmlformats.org/presentationml/2006/ole">
             <mc:AlternateContent xmlns:mc="http://schemas.openxmlformats.org/markup-compatibility/2006">
               <mc:Choice xmlns:v="urn:schemas-microsoft-com:vml" Requires="v">
-                <p:oleObj spid="_x0000_s1060" name="think-cell Slide" r:id="rId7" imgW="270" imgH="270" progId="TCLayout.ActiveDocument.1">
+                <p:oleObj spid="_x0000_s1061" name="think-cell Slide" r:id="rId7" imgW="270" imgH="270" progId="TCLayout.ActiveDocument.1">
                   <p:embed/>
                 </p:oleObj>
               </mc:Choice>
@@ -10179,7 +10181,7 @@
           <a:graphicData uri="http://schemas.openxmlformats.org/presentationml/2006/ole">
             <mc:AlternateContent xmlns:mc="http://schemas.openxmlformats.org/markup-compatibility/2006">
               <mc:Choice xmlns:v="urn:schemas-microsoft-com:vml" Requires="v">
-                <p:oleObj spid="_x0000_s2081" name="think-cell Slide" r:id="rId6" imgW="270" imgH="270" progId="TCLayout.ActiveDocument.1">
+                <p:oleObj spid="_x0000_s2082" name="think-cell Slide" r:id="rId6" imgW="270" imgH="270" progId="TCLayout.ActiveDocument.1">
                   <p:embed/>
                 </p:oleObj>
               </mc:Choice>
@@ -11371,7 +11373,7 @@
           <a:graphicData uri="http://schemas.openxmlformats.org/presentationml/2006/ole">
             <mc:AlternateContent xmlns:mc="http://schemas.openxmlformats.org/markup-compatibility/2006">
               <mc:Choice xmlns:v="urn:schemas-microsoft-com:vml" Requires="v">
-                <p:oleObj spid="_x0000_s3104" name="think-cell Slide" r:id="rId6" imgW="270" imgH="270" progId="TCLayout.ActiveDocument.1">
+                <p:oleObj spid="_x0000_s3105" name="think-cell Slide" r:id="rId6" imgW="270" imgH="270" progId="TCLayout.ActiveDocument.1">
                   <p:embed/>
                 </p:oleObj>
               </mc:Choice>
@@ -12855,7 +12857,7 @@
           <a:graphicData uri="http://schemas.openxmlformats.org/presentationml/2006/ole">
             <mc:AlternateContent xmlns:mc="http://schemas.openxmlformats.org/markup-compatibility/2006">
               <mc:Choice xmlns:v="urn:schemas-microsoft-com:vml" Requires="v">
-                <p:oleObj spid="_x0000_s6171" name="think-cell Slide" r:id="rId5" imgW="270" imgH="270" progId="TCLayout.ActiveDocument.1">
+                <p:oleObj spid="_x0000_s6172" name="think-cell Slide" r:id="rId5" imgW="270" imgH="270" progId="TCLayout.ActiveDocument.1">
                   <p:embed/>
                 </p:oleObj>
               </mc:Choice>
@@ -13291,6 +13293,286 @@
 </file>
 
 <file path=ppt/slides/slide18.xml><?xml version="1.0" encoding="utf-8"?>
+<p:sld xmlns:a="http://schemas.openxmlformats.org/drawingml/2006/main" xmlns:r="http://schemas.openxmlformats.org/officeDocument/2006/relationships" xmlns:p="http://schemas.openxmlformats.org/presentationml/2006/main">
+  <p:cSld>
+    <p:spTree>
+      <p:nvGrpSpPr>
+        <p:cNvPr id="1" name=""/>
+        <p:cNvGrpSpPr/>
+        <p:nvPr/>
+      </p:nvGrpSpPr>
+      <p:grpSpPr>
+        <a:xfrm>
+          <a:off x="0" y="0"/>
+          <a:ext cx="0" cy="0"/>
+          <a:chOff x="0" y="0"/>
+          <a:chExt cx="0" cy="0"/>
+        </a:xfrm>
+      </p:grpSpPr>
+      <p:sp>
+        <p:nvSpPr>
+          <p:cNvPr id="2" name="Title 1"/>
+          <p:cNvSpPr>
+            <a:spLocks noGrp="1"/>
+          </p:cNvSpPr>
+          <p:nvPr>
+            <p:ph type="title"/>
+          </p:nvPr>
+        </p:nvSpPr>
+        <p:spPr/>
+        <p:txBody>
+          <a:bodyPr>
+            <a:normAutofit fontScale="90000"/>
+          </a:bodyPr>
+          <a:lstStyle/>
+          <a:p>
+            <a:r>
+              <a:rPr lang="en-US" dirty="0">
+                <a:solidFill>
+                  <a:schemeClr val="bg1"/>
+                </a:solidFill>
+              </a:rPr>
+              <a:t>Integrated development experience powered by Visual Studio + Azure SDK</a:t>
+            </a:r>
+          </a:p>
+        </p:txBody>
+      </p:sp>
+      <p:sp>
+        <p:nvSpPr>
+          <p:cNvPr id="3" name="Content Placeholder 2"/>
+          <p:cNvSpPr>
+            <a:spLocks noGrp="1"/>
+          </p:cNvSpPr>
+          <p:nvPr>
+            <p:ph sz="quarter" idx="10"/>
+          </p:nvPr>
+        </p:nvSpPr>
+        <p:spPr>
+          <a:xfrm>
+            <a:off x="519249" y="2066104"/>
+            <a:ext cx="7602776" cy="4538678"/>
+          </a:xfrm>
+        </p:spPr>
+        <p:txBody>
+          <a:bodyPr/>
+          <a:lstStyle/>
+          <a:p>
+            <a:r>
+              <a:rPr lang="en-US" sz="2800" dirty="0" smtClean="0"/>
+              <a:t>Development </a:t>
+            </a:r>
+            <a:r>
+              <a:rPr lang="en-US" sz="2800" dirty="0"/>
+              <a:t>experience using the </a:t>
+            </a:r>
+            <a:r>
+              <a:rPr lang="en-US" sz="2900" dirty="0">
+                <a:solidFill>
+                  <a:srgbClr val="FFC000"/>
+                </a:solidFill>
+              </a:rPr>
+              <a:t>Azure SDK</a:t>
+            </a:r>
+            <a:r>
+              <a:rPr lang="en-US" sz="2800" dirty="0"/>
+              <a:t>, integrated seamlessly with </a:t>
+            </a:r>
+            <a:r>
+              <a:rPr lang="en-US" sz="2900" dirty="0">
+                <a:solidFill>
+                  <a:srgbClr val="FFC000"/>
+                </a:solidFill>
+              </a:rPr>
+              <a:t>Visual Studio</a:t>
+            </a:r>
+            <a:r>
+              <a:rPr lang="en-US" sz="2800" dirty="0" smtClean="0"/>
+              <a:t>.</a:t>
+            </a:r>
+          </a:p>
+          <a:p>
+            <a:endParaRPr lang="en-US" sz="2800" dirty="0" smtClean="0"/>
+          </a:p>
+          <a:p>
+            <a:r>
+              <a:rPr lang="en-US" sz="2800" dirty="0" smtClean="0"/>
+              <a:t>Deploy </a:t>
+            </a:r>
+            <a:r>
+              <a:rPr lang="en-US" sz="2800" dirty="0"/>
+              <a:t>using </a:t>
+            </a:r>
+            <a:r>
+              <a:rPr lang="en-US" sz="2900" dirty="0">
+                <a:solidFill>
+                  <a:srgbClr val="FFC000"/>
+                </a:solidFill>
+              </a:rPr>
+              <a:t>any language </a:t>
+            </a:r>
+            <a:r>
+              <a:rPr lang="en-US" sz="2800" dirty="0"/>
+              <a:t>you like, including </a:t>
+            </a:r>
+            <a:r>
+              <a:rPr lang="en-US" sz="2900" dirty="0">
+                <a:solidFill>
+                  <a:srgbClr val="FFC000"/>
+                </a:solidFill>
+              </a:rPr>
+              <a:t>.NET</a:t>
+            </a:r>
+            <a:r>
+              <a:rPr lang="en-US" sz="2800" dirty="0"/>
+              <a:t>, </a:t>
+            </a:r>
+            <a:r>
+              <a:rPr lang="en-US" sz="2900" dirty="0">
+                <a:solidFill>
+                  <a:srgbClr val="FFC000"/>
+                </a:solidFill>
+              </a:rPr>
+              <a:t>Java</a:t>
+            </a:r>
+            <a:r>
+              <a:rPr lang="en-US" sz="2800" dirty="0"/>
+              <a:t>, </a:t>
+            </a:r>
+            <a:r>
+              <a:rPr lang="en-US" sz="2900" dirty="0">
+                <a:solidFill>
+                  <a:srgbClr val="FFC000"/>
+                </a:solidFill>
+              </a:rPr>
+              <a:t>Node.js</a:t>
+            </a:r>
+            <a:r>
+              <a:rPr lang="en-US" sz="2800" dirty="0"/>
+              <a:t>, </a:t>
+            </a:r>
+            <a:r>
+              <a:rPr lang="en-US" sz="2900" dirty="0">
+                <a:solidFill>
+                  <a:srgbClr val="FFC000"/>
+                </a:solidFill>
+              </a:rPr>
+              <a:t>PHP</a:t>
+            </a:r>
+            <a:r>
+              <a:rPr lang="en-US" sz="2800" dirty="0"/>
+              <a:t>, </a:t>
+            </a:r>
+            <a:r>
+              <a:rPr lang="en-US" sz="2900" dirty="0">
+                <a:solidFill>
+                  <a:srgbClr val="FFC000"/>
+                </a:solidFill>
+              </a:rPr>
+              <a:t>Python</a:t>
+            </a:r>
+            <a:r>
+              <a:rPr lang="en-US" sz="2800" dirty="0"/>
+              <a:t>, or </a:t>
+            </a:r>
+            <a:r>
+              <a:rPr lang="en-US" sz="2900" dirty="0">
+                <a:solidFill>
+                  <a:srgbClr val="FFC000"/>
+                </a:solidFill>
+              </a:rPr>
+              <a:t>Ruby</a:t>
+            </a:r>
+            <a:r>
+              <a:rPr lang="en-US" sz="2800" dirty="0" smtClean="0"/>
+              <a:t>.</a:t>
+            </a:r>
+          </a:p>
+          <a:p>
+            <a:endParaRPr lang="en-US" sz="2800" dirty="0" smtClean="0"/>
+          </a:p>
+          <a:p>
+            <a:r>
+              <a:rPr lang="en-US" sz="2900" dirty="0">
+                <a:solidFill>
+                  <a:srgbClr val="FFC000"/>
+                </a:solidFill>
+              </a:rPr>
+              <a:t>Test </a:t>
+            </a:r>
+            <a:r>
+              <a:rPr lang="en-US" sz="2900" dirty="0">
+                <a:solidFill>
+                  <a:srgbClr val="FFC000"/>
+                </a:solidFill>
+              </a:rPr>
+              <a:t>your application </a:t>
+            </a:r>
+            <a:r>
+              <a:rPr lang="en-US" sz="2800" dirty="0"/>
+              <a:t>before deploying to the cloud using the </a:t>
+            </a:r>
+            <a:r>
+              <a:rPr lang="en-US" sz="2900" dirty="0">
+                <a:solidFill>
+                  <a:srgbClr val="FFC000"/>
+                </a:solidFill>
+              </a:rPr>
+              <a:t>Azure Emulator</a:t>
+            </a:r>
+            <a:r>
+              <a:rPr lang="en-US" sz="2800" dirty="0"/>
+              <a:t>, which brings the platform’s key functionality right to your dev machine. </a:t>
+            </a:r>
+          </a:p>
+        </p:txBody>
+      </p:sp>
+      <p:pic>
+        <p:nvPicPr>
+          <p:cNvPr id="4" name="Picture 3"/>
+          <p:cNvPicPr>
+            <a:picLocks noChangeAspect="1"/>
+          </p:cNvPicPr>
+          <p:nvPr/>
+        </p:nvPicPr>
+        <p:blipFill>
+          <a:blip r:embed="rId2">
+            <a:extLst>
+              <a:ext uri="{28A0092B-C50C-407E-A947-70E740481C1C}">
+                <a14:useLocalDpi xmlns:a14="http://schemas.microsoft.com/office/drawing/2010/main" val="0"/>
+              </a:ext>
+            </a:extLst>
+          </a:blip>
+          <a:stretch>
+            <a:fillRect/>
+          </a:stretch>
+        </p:blipFill>
+        <p:spPr>
+          <a:xfrm>
+            <a:off x="8383795" y="2607607"/>
+            <a:ext cx="3922954" cy="2521900"/>
+          </a:xfrm>
+          <a:prstGeom prst="rect">
+            <a:avLst/>
+          </a:prstGeom>
+        </p:spPr>
+      </p:pic>
+    </p:spTree>
+    <p:extLst>
+      <p:ext uri="{BB962C8B-B14F-4D97-AF65-F5344CB8AC3E}">
+        <p14:creationId xmlns:p14="http://schemas.microsoft.com/office/powerpoint/2010/main" val="122176672"/>
+      </p:ext>
+    </p:extLst>
+  </p:cSld>
+  <p:clrMapOvr>
+    <a:masterClrMapping/>
+  </p:clrMapOvr>
+  <p:transition>
+    <p:fade/>
+  </p:transition>
+</p:sld>
+</file>
+
+<file path=ppt/slides/slide19.xml><?xml version="1.0" encoding="utf-8"?>
 <p:sld xmlns:a="http://schemas.openxmlformats.org/drawingml/2006/main" xmlns:r="http://schemas.openxmlformats.org/officeDocument/2006/relationships" xmlns:p="http://schemas.openxmlformats.org/presentationml/2006/main">
   <p:cSld>
     <p:spTree>
@@ -13481,86 +13763,6 @@
     <p:bldLst>
       <p:bldP spid="3" grpId="0" build="p"/>
     </p:bldLst>
-  </p:timing>
-</p:sld>
-</file>
-
-<file path=ppt/slides/slide19.xml><?xml version="1.0" encoding="utf-8"?>
-<p:sld xmlns:a="http://schemas.openxmlformats.org/drawingml/2006/main" xmlns:r="http://schemas.openxmlformats.org/officeDocument/2006/relationships" xmlns:p="http://schemas.openxmlformats.org/presentationml/2006/main">
-  <p:cSld>
-    <p:spTree>
-      <p:nvGrpSpPr>
-        <p:cNvPr id="1" name=""/>
-        <p:cNvGrpSpPr/>
-        <p:nvPr/>
-      </p:nvGrpSpPr>
-      <p:grpSpPr>
-        <a:xfrm>
-          <a:off x="0" y="0"/>
-          <a:ext cx="0" cy="0"/>
-          <a:chOff x="0" y="0"/>
-          <a:chExt cx="0" cy="0"/>
-        </a:xfrm>
-      </p:grpSpPr>
-      <p:sp>
-        <p:nvSpPr>
-          <p:cNvPr id="2" name="Title 1"/>
-          <p:cNvSpPr>
-            <a:spLocks noGrp="1"/>
-          </p:cNvSpPr>
-          <p:nvPr>
-            <p:ph type="ctrTitle"/>
-          </p:nvPr>
-        </p:nvSpPr>
-        <p:spPr/>
-        <p:txBody>
-          <a:bodyPr/>
-          <a:lstStyle/>
-          <a:p>
-            <a:r>
-              <a:rPr lang="en-US" altLang="zh-CN" sz="13800" dirty="0" smtClean="0">
-                <a:solidFill>
-                  <a:schemeClr val="bg1"/>
-                </a:solidFill>
-              </a:rPr>
-              <a:t>Design for Cloud</a:t>
-            </a:r>
-            <a:endParaRPr lang="en-US" sz="13800" dirty="0">
-              <a:solidFill>
-                <a:schemeClr val="bg1"/>
-              </a:solidFill>
-            </a:endParaRPr>
-          </a:p>
-        </p:txBody>
-      </p:sp>
-    </p:spTree>
-    <p:extLst>
-      <p:ext uri="{BB962C8B-B14F-4D97-AF65-F5344CB8AC3E}">
-        <p14:creationId xmlns:p14="http://schemas.microsoft.com/office/powerpoint/2010/main" val="1988179541"/>
-      </p:ext>
-    </p:extLst>
-  </p:cSld>
-  <p:clrMapOvr>
-    <a:masterClrMapping/>
-  </p:clrMapOvr>
-  <mc:AlternateContent xmlns:mc="http://schemas.openxmlformats.org/markup-compatibility/2006" xmlns:p14="http://schemas.microsoft.com/office/powerpoint/2010/main">
-    <mc:Choice Requires="p14">
-      <p:transition spd="med" p14:dur="700">
-        <p:fade/>
-      </p:transition>
-    </mc:Choice>
-    <mc:Fallback xmlns="">
-      <p:transition spd="med">
-        <p:fade/>
-      </p:transition>
-    </mc:Fallback>
-  </mc:AlternateContent>
-  <p:timing>
-    <p:tnLst>
-      <p:par>
-        <p:cTn id="1" dur="indefinite" restart="never" nodeType="tmRoot"/>
-      </p:par>
-    </p:tnLst>
   </p:timing>
 </p:sld>
 </file>
@@ -13980,6 +14182,86 @@
       </p:grpSpPr>
       <p:sp>
         <p:nvSpPr>
+          <p:cNvPr id="2" name="Title 1"/>
+          <p:cNvSpPr>
+            <a:spLocks noGrp="1"/>
+          </p:cNvSpPr>
+          <p:nvPr>
+            <p:ph type="ctrTitle"/>
+          </p:nvPr>
+        </p:nvSpPr>
+        <p:spPr/>
+        <p:txBody>
+          <a:bodyPr/>
+          <a:lstStyle/>
+          <a:p>
+            <a:r>
+              <a:rPr lang="en-US" altLang="zh-CN" sz="13800" dirty="0" smtClean="0">
+                <a:solidFill>
+                  <a:schemeClr val="bg1"/>
+                </a:solidFill>
+              </a:rPr>
+              <a:t>Design for Cloud</a:t>
+            </a:r>
+            <a:endParaRPr lang="en-US" sz="13800" dirty="0">
+              <a:solidFill>
+                <a:schemeClr val="bg1"/>
+              </a:solidFill>
+            </a:endParaRPr>
+          </a:p>
+        </p:txBody>
+      </p:sp>
+    </p:spTree>
+    <p:extLst>
+      <p:ext uri="{BB962C8B-B14F-4D97-AF65-F5344CB8AC3E}">
+        <p14:creationId xmlns:p14="http://schemas.microsoft.com/office/powerpoint/2010/main" val="1988179541"/>
+      </p:ext>
+    </p:extLst>
+  </p:cSld>
+  <p:clrMapOvr>
+    <a:masterClrMapping/>
+  </p:clrMapOvr>
+  <mc:AlternateContent xmlns:mc="http://schemas.openxmlformats.org/markup-compatibility/2006" xmlns:p14="http://schemas.microsoft.com/office/powerpoint/2010/main">
+    <mc:Choice Requires="p14">
+      <p:transition spd="med" p14:dur="700">
+        <p:fade/>
+      </p:transition>
+    </mc:Choice>
+    <mc:Fallback xmlns="">
+      <p:transition spd="med">
+        <p:fade/>
+      </p:transition>
+    </mc:Fallback>
+  </mc:AlternateContent>
+  <p:timing>
+    <p:tnLst>
+      <p:par>
+        <p:cTn id="1" dur="indefinite" restart="never" nodeType="tmRoot"/>
+      </p:par>
+    </p:tnLst>
+  </p:timing>
+</p:sld>
+</file>
+
+<file path=ppt/slides/slide21.xml><?xml version="1.0" encoding="utf-8"?>
+<p:sld xmlns:a="http://schemas.openxmlformats.org/drawingml/2006/main" xmlns:r="http://schemas.openxmlformats.org/officeDocument/2006/relationships" xmlns:p="http://schemas.openxmlformats.org/presentationml/2006/main">
+  <p:cSld>
+    <p:spTree>
+      <p:nvGrpSpPr>
+        <p:cNvPr id="1" name=""/>
+        <p:cNvGrpSpPr/>
+        <p:nvPr/>
+      </p:nvGrpSpPr>
+      <p:grpSpPr>
+        <a:xfrm>
+          <a:off x="0" y="0"/>
+          <a:ext cx="0" cy="0"/>
+          <a:chOff x="0" y="0"/>
+          <a:chExt cx="0" cy="0"/>
+        </a:xfrm>
+      </p:grpSpPr>
+      <p:sp>
+        <p:nvSpPr>
           <p:cNvPr id="5" name="Title 4"/>
           <p:cNvSpPr>
             <a:spLocks noGrp="1"/>
@@ -14361,7 +14643,7 @@
 </p:sld>
 </file>
 
-<file path=ppt/slides/slide21.xml><?xml version="1.0" encoding="utf-8"?>
+<file path=ppt/slides/slide22.xml><?xml version="1.0" encoding="utf-8"?>
 <p:sld xmlns:a="http://schemas.openxmlformats.org/drawingml/2006/main" xmlns:r="http://schemas.openxmlformats.org/officeDocument/2006/relationships" xmlns:p="http://schemas.openxmlformats.org/presentationml/2006/main">
   <p:cSld>
     <p:spTree>
@@ -20535,7 +20817,7 @@
 </p:sld>
 </file>
 
-<file path=ppt/slides/slide22.xml><?xml version="1.0" encoding="utf-8"?>
+<file path=ppt/slides/slide23.xml><?xml version="1.0" encoding="utf-8"?>
 <p:sld xmlns:a="http://schemas.openxmlformats.org/drawingml/2006/main" xmlns:r="http://schemas.openxmlformats.org/officeDocument/2006/relationships" xmlns:p="http://schemas.openxmlformats.org/presentationml/2006/main">
   <p:cSld>
     <p:spTree>
@@ -21133,7 +21415,7 @@
 </p:sld>
 </file>
 
-<file path=ppt/slides/slide23.xml><?xml version="1.0" encoding="utf-8"?>
+<file path=ppt/slides/slide24.xml><?xml version="1.0" encoding="utf-8"?>
 <p:sld xmlns:a="http://schemas.openxmlformats.org/drawingml/2006/main" xmlns:r="http://schemas.openxmlformats.org/officeDocument/2006/relationships" xmlns:p="http://schemas.openxmlformats.org/presentationml/2006/main">
   <p:cSld>
     <p:spTree>
@@ -21798,7 +22080,7 @@
 </p:sld>
 </file>
 
-<file path=ppt/slides/slide24.xml><?xml version="1.0" encoding="utf-8"?>
+<file path=ppt/slides/slide25.xml><?xml version="1.0" encoding="utf-8"?>
 <p:sld xmlns:a="http://schemas.openxmlformats.org/drawingml/2006/main" xmlns:r="http://schemas.openxmlformats.org/officeDocument/2006/relationships" xmlns:p="http://schemas.openxmlformats.org/presentationml/2006/main">
   <p:cSld>
     <p:spTree>
@@ -23022,7 +23304,7 @@
 </p:sld>
 </file>
 
-<file path=ppt/slides/slide25.xml><?xml version="1.0" encoding="utf-8"?>
+<file path=ppt/slides/slide26.xml><?xml version="1.0" encoding="utf-8"?>
 <p:sld xmlns:a="http://schemas.openxmlformats.org/drawingml/2006/main" xmlns:r="http://schemas.openxmlformats.org/officeDocument/2006/relationships" xmlns:p="http://schemas.openxmlformats.org/presentationml/2006/main" show="0">
   <p:cSld>
     <p:spTree>
@@ -25034,7 +25316,7 @@
 </p:sld>
 </file>
 
-<file path=ppt/slides/slide26.xml><?xml version="1.0" encoding="utf-8"?>
+<file path=ppt/slides/slide27.xml><?xml version="1.0" encoding="utf-8"?>
 <p:sld xmlns:a="http://schemas.openxmlformats.org/drawingml/2006/main" xmlns:r="http://schemas.openxmlformats.org/officeDocument/2006/relationships" xmlns:p="http://schemas.openxmlformats.org/presentationml/2006/main" show="0">
   <p:cSld>
     <p:spTree>
@@ -27830,7 +28112,7 @@
 </p:sld>
 </file>
 
-<file path=ppt/slides/slide27.xml><?xml version="1.0" encoding="utf-8"?>
+<file path=ppt/slides/slide28.xml><?xml version="1.0" encoding="utf-8"?>
 <p:sld xmlns:a="http://schemas.openxmlformats.org/drawingml/2006/main" xmlns:r="http://schemas.openxmlformats.org/officeDocument/2006/relationships" xmlns:p="http://schemas.openxmlformats.org/presentationml/2006/main">
   <p:cSld>
     <p:spTree>
@@ -28376,7 +28658,7 @@
 </p:sld>
 </file>
 
-<file path=ppt/slides/slide28.xml><?xml version="1.0" encoding="utf-8"?>
+<file path=ppt/slides/slide29.xml><?xml version="1.0" encoding="utf-8"?>
 <p:sld xmlns:a="http://schemas.openxmlformats.org/drawingml/2006/main" xmlns:r="http://schemas.openxmlformats.org/officeDocument/2006/relationships" xmlns:p="http://schemas.openxmlformats.org/presentationml/2006/main">
   <p:cSld>
     <p:spTree>
@@ -29149,55 +29431,6 @@
 </p:sld>
 </file>
 
-<file path=ppt/slides/slide29.xml><?xml version="1.0" encoding="utf-8"?>
-<p:sld xmlns:a="http://schemas.openxmlformats.org/drawingml/2006/main" xmlns:r="http://schemas.openxmlformats.org/officeDocument/2006/relationships" xmlns:p="http://schemas.openxmlformats.org/presentationml/2006/main">
-  <p:cSld>
-    <p:spTree>
-      <p:nvGrpSpPr>
-        <p:cNvPr id="1" name=""/>
-        <p:cNvGrpSpPr/>
-        <p:nvPr/>
-      </p:nvGrpSpPr>
-      <p:grpSpPr>
-        <a:xfrm>
-          <a:off x="0" y="0"/>
-          <a:ext cx="0" cy="0"/>
-          <a:chOff x="0" y="0"/>
-          <a:chExt cx="0" cy="0"/>
-        </a:xfrm>
-      </p:grpSpPr>
-    </p:spTree>
-    <p:extLst>
-      <p:ext uri="{BB962C8B-B14F-4D97-AF65-F5344CB8AC3E}">
-        <p14:creationId xmlns:p14="http://schemas.microsoft.com/office/powerpoint/2010/main" val="981978785"/>
-      </p:ext>
-    </p:extLst>
-  </p:cSld>
-  <p:clrMapOvr>
-    <a:masterClrMapping/>
-  </p:clrMapOvr>
-  <mc:AlternateContent xmlns:mc="http://schemas.openxmlformats.org/markup-compatibility/2006" xmlns:p14="http://schemas.microsoft.com/office/powerpoint/2010/main">
-    <mc:Choice Requires="p14">
-      <p:transition spd="med" p14:dur="700">
-        <p:fade/>
-      </p:transition>
-    </mc:Choice>
-    <mc:Fallback xmlns="">
-      <p:transition spd="med">
-        <p:fade/>
-      </p:transition>
-    </mc:Fallback>
-  </mc:AlternateContent>
-  <p:timing>
-    <p:tnLst>
-      <p:par>
-        <p:cTn id="1" dur="indefinite" restart="never" nodeType="tmRoot"/>
-      </p:par>
-    </p:tnLst>
-  </p:timing>
-</p:sld>
-</file>
-
 <file path=ppt/slides/slide3.xml><?xml version="1.0" encoding="utf-8"?>
 <p:sld xmlns:a="http://schemas.openxmlformats.org/drawingml/2006/main" xmlns:r="http://schemas.openxmlformats.org/officeDocument/2006/relationships" xmlns:p="http://schemas.openxmlformats.org/presentationml/2006/main">
   <p:cSld>
@@ -29263,15 +29496,7 @@
                   <a:prstClr val="white"/>
                 </a:solidFill>
               </a:rPr>
-              <a:t>The three ways to host your applications </a:t>
-            </a:r>
-            <a:r>
-              <a:rPr lang="en-US" sz="2800" dirty="0" smtClean="0">
-                <a:solidFill>
-                  <a:prstClr val="white"/>
-                </a:solidFill>
-              </a:rPr>
-              <a:t>on the Microsoft Azure Platform</a:t>
+              <a:t>The three ways to host your applications on the Microsoft Azure Platform</a:t>
             </a:r>
             <a:endParaRPr lang="en-US" sz="2800" dirty="0">
               <a:solidFill>
@@ -29542,12 +29767,61 @@
   <p:clrMapOvr>
     <a:masterClrMapping/>
   </p:clrMapOvr>
-  <mc:AlternateContent xmlns:mc="http://schemas.openxmlformats.org/markup-compatibility/2006">
-    <mc:Choice xmlns:p14="http://schemas.microsoft.com/office/powerpoint/2010/main" Requires="p14">
+  <mc:AlternateContent xmlns:mc="http://schemas.openxmlformats.org/markup-compatibility/2006" xmlns:p14="http://schemas.microsoft.com/office/powerpoint/2010/main">
+    <mc:Choice Requires="p14">
       <p:transition spd="slow" p14:dur="2000"/>
     </mc:Choice>
-    <mc:Fallback>
+    <mc:Fallback xmlns="">
       <p:transition spd="slow"/>
+    </mc:Fallback>
+  </mc:AlternateContent>
+  <p:timing>
+    <p:tnLst>
+      <p:par>
+        <p:cTn id="1" dur="indefinite" restart="never" nodeType="tmRoot"/>
+      </p:par>
+    </p:tnLst>
+  </p:timing>
+</p:sld>
+</file>
+
+<file path=ppt/slides/slide30.xml><?xml version="1.0" encoding="utf-8"?>
+<p:sld xmlns:a="http://schemas.openxmlformats.org/drawingml/2006/main" xmlns:r="http://schemas.openxmlformats.org/officeDocument/2006/relationships" xmlns:p="http://schemas.openxmlformats.org/presentationml/2006/main">
+  <p:cSld>
+    <p:spTree>
+      <p:nvGrpSpPr>
+        <p:cNvPr id="1" name=""/>
+        <p:cNvGrpSpPr/>
+        <p:nvPr/>
+      </p:nvGrpSpPr>
+      <p:grpSpPr>
+        <a:xfrm>
+          <a:off x="0" y="0"/>
+          <a:ext cx="0" cy="0"/>
+          <a:chOff x="0" y="0"/>
+          <a:chExt cx="0" cy="0"/>
+        </a:xfrm>
+      </p:grpSpPr>
+    </p:spTree>
+    <p:extLst>
+      <p:ext uri="{BB962C8B-B14F-4D97-AF65-F5344CB8AC3E}">
+        <p14:creationId xmlns:p14="http://schemas.microsoft.com/office/powerpoint/2010/main" val="981978785"/>
+      </p:ext>
+    </p:extLst>
+  </p:cSld>
+  <p:clrMapOvr>
+    <a:masterClrMapping/>
+  </p:clrMapOvr>
+  <mc:AlternateContent xmlns:mc="http://schemas.openxmlformats.org/markup-compatibility/2006" xmlns:p14="http://schemas.microsoft.com/office/powerpoint/2010/main">
+    <mc:Choice Requires="p14">
+      <p:transition spd="med" p14:dur="700">
+        <p:fade/>
+      </p:transition>
+    </mc:Choice>
+    <mc:Fallback xmlns="">
+      <p:transition spd="med">
+        <p:fade/>
+      </p:transition>
     </mc:Fallback>
   </mc:AlternateContent>
   <p:timing>
@@ -36477,7 +36751,7 @@
           <a:graphicData uri="http://schemas.openxmlformats.org/presentationml/2006/ole">
             <mc:AlternateContent xmlns:mc="http://schemas.openxmlformats.org/markup-compatibility/2006">
               <mc:Choice xmlns:v="urn:schemas-microsoft-com:vml" Requires="v">
-                <p:oleObj spid="_x0000_s7178" name="think-cell Slide" r:id="rId5" imgW="270" imgH="270" progId="TCLayout.ActiveDocument.1">
+                <p:oleObj spid="_x0000_s7179" name="think-cell Slide" r:id="rId5" imgW="270" imgH="270" progId="TCLayout.ActiveDocument.1">
                   <p:embed/>
                 </p:oleObj>
               </mc:Choice>
@@ -37494,17 +37768,12 @@
 </file>
 
 <file path=customXml/item1.xml><?xml version="1.0" encoding="utf-8"?>
-<p:properties xmlns:p="http://schemas.microsoft.com/office/2006/metadata/properties" xmlns:xsi="http://www.w3.org/2001/XMLSchema-instance" xmlns:pc="http://schemas.microsoft.com/office/infopath/2007/PartnerControls">
-  <documentManagement>
-    <SharedWithUsers xmlns="fee586e5-3c92-48eb-9898-42915e590ada">
-      <UserInfo>
-        <DisplayName>Rick Claus</DisplayName>
-        <AccountId>401</AccountId>
-        <AccountType/>
-      </UserInfo>
-    </SharedWithUsers>
-  </documentManagement>
-</p:properties>
+<?mso-contentType ?>
+<FormTemplates xmlns="http://schemas.microsoft.com/sharepoint/v3/contenttype/forms">
+  <Display>DocumentLibraryForm</Display>
+  <Edit>DocumentLibraryForm</Edit>
+  <New>DocumentLibraryForm</New>
+</FormTemplates>
 </file>
 
 <file path=customXml/item2.xml><?xml version="1.0" encoding="utf-8"?>
@@ -37648,26 +37917,23 @@
 </file>
 
 <file path=customXml/item3.xml><?xml version="1.0" encoding="utf-8"?>
-<?mso-contentType ?>
-<FormTemplates xmlns="http://schemas.microsoft.com/sharepoint/v3/contenttype/forms">
-  <Display>DocumentLibraryForm</Display>
-  <Edit>DocumentLibraryForm</Edit>
-  <New>DocumentLibraryForm</New>
-</FormTemplates>
+<p:properties xmlns:p="http://schemas.microsoft.com/office/2006/metadata/properties" xmlns:xsi="http://www.w3.org/2001/XMLSchema-instance" xmlns:pc="http://schemas.microsoft.com/office/infopath/2007/PartnerControls">
+  <documentManagement>
+    <SharedWithUsers xmlns="fee586e5-3c92-48eb-9898-42915e590ada">
+      <UserInfo>
+        <DisplayName>Rick Claus</DisplayName>
+        <AccountId>401</AccountId>
+        <AccountType/>
+      </UserInfo>
+    </SharedWithUsers>
+  </documentManagement>
+</p:properties>
 </file>
 
 <file path=customXml/itemProps1.xml><?xml version="1.0" encoding="utf-8"?>
-<ds:datastoreItem xmlns:ds="http://schemas.openxmlformats.org/officeDocument/2006/customXml" ds:itemID="{B030EFEA-9AEA-457C-BAA8-93C4281792F5}">
+<ds:datastoreItem xmlns:ds="http://schemas.openxmlformats.org/officeDocument/2006/customXml" ds:itemID="{14B32142-DE2C-423C-A302-95CAC214862A}">
   <ds:schemaRefs>
-    <ds:schemaRef ds:uri="http://purl.org/dc/terms/"/>
-    <ds:schemaRef ds:uri="http://schemas.openxmlformats.org/package/2006/metadata/core-properties"/>
-    <ds:schemaRef ds:uri="http://schemas.microsoft.com/office/2006/documentManagement/types"/>
-    <ds:schemaRef ds:uri="http://schemas.microsoft.com/office/infopath/2007/PartnerControls"/>
-    <ds:schemaRef ds:uri="http://purl.org/dc/elements/1.1/"/>
-    <ds:schemaRef ds:uri="http://schemas.microsoft.com/office/2006/metadata/properties"/>
-    <ds:schemaRef ds:uri="fee586e5-3c92-48eb-9898-42915e590ada"/>
-    <ds:schemaRef ds:uri="http://www.w3.org/XML/1998/namespace"/>
-    <ds:schemaRef ds:uri="http://purl.org/dc/dcmitype/"/>
+    <ds:schemaRef ds:uri="http://schemas.microsoft.com/sharepoint/v3/contenttype/forms"/>
   </ds:schemaRefs>
 </ds:datastoreItem>
 </file>
@@ -37691,9 +37957,17 @@
 </file>
 
 <file path=customXml/itemProps3.xml><?xml version="1.0" encoding="utf-8"?>
-<ds:datastoreItem xmlns:ds="http://schemas.openxmlformats.org/officeDocument/2006/customXml" ds:itemID="{14B32142-DE2C-423C-A302-95CAC214862A}">
+<ds:datastoreItem xmlns:ds="http://schemas.openxmlformats.org/officeDocument/2006/customXml" ds:itemID="{B030EFEA-9AEA-457C-BAA8-93C4281792F5}">
   <ds:schemaRefs>
-    <ds:schemaRef ds:uri="http://schemas.microsoft.com/sharepoint/v3/contenttype/forms"/>
+    <ds:schemaRef ds:uri="http://purl.org/dc/terms/"/>
+    <ds:schemaRef ds:uri="http://schemas.openxmlformats.org/package/2006/metadata/core-properties"/>
+    <ds:schemaRef ds:uri="http://schemas.microsoft.com/office/2006/documentManagement/types"/>
+    <ds:schemaRef ds:uri="http://schemas.microsoft.com/office/infopath/2007/PartnerControls"/>
+    <ds:schemaRef ds:uri="http://purl.org/dc/elements/1.1/"/>
+    <ds:schemaRef ds:uri="http://schemas.microsoft.com/office/2006/metadata/properties"/>
+    <ds:schemaRef ds:uri="fee586e5-3c92-48eb-9898-42915e590ada"/>
+    <ds:schemaRef ds:uri="http://www.w3.org/XML/1998/namespace"/>
+    <ds:schemaRef ds:uri="http://purl.org/dc/dcmitype/"/>
   </ds:schemaRefs>
 </ds:datastoreItem>
 </file>
</xml_diff>